<commit_message>
Several files (after Git slides ends)
</commit_message>
<xml_diff>
--- a/Slides/5. Git 초급.pptx
+++ b/Slides/5. Git 초급.pptx
@@ -46,24 +46,24 @@
     <p:sldId id="322" r:id="rId37"/>
     <p:sldId id="338" r:id="rId38"/>
     <p:sldId id="301" r:id="rId39"/>
-    <p:sldId id="346" r:id="rId40"/>
-    <p:sldId id="341" r:id="rId41"/>
-    <p:sldId id="340" r:id="rId42"/>
-    <p:sldId id="339" r:id="rId43"/>
-    <p:sldId id="323" r:id="rId44"/>
-    <p:sldId id="324" r:id="rId45"/>
-    <p:sldId id="345" r:id="rId46"/>
-    <p:sldId id="327" r:id="rId47"/>
-    <p:sldId id="326" r:id="rId48"/>
-    <p:sldId id="325" r:id="rId49"/>
-    <p:sldId id="329" r:id="rId50"/>
-    <p:sldId id="330" r:id="rId51"/>
-    <p:sldId id="284" r:id="rId52"/>
-    <p:sldId id="331" r:id="rId53"/>
-    <p:sldId id="334" r:id="rId54"/>
-    <p:sldId id="335" r:id="rId55"/>
-    <p:sldId id="336" r:id="rId56"/>
-    <p:sldId id="337" r:id="rId57"/>
+    <p:sldId id="341" r:id="rId40"/>
+    <p:sldId id="340" r:id="rId41"/>
+    <p:sldId id="339" r:id="rId42"/>
+    <p:sldId id="323" r:id="rId43"/>
+    <p:sldId id="324" r:id="rId44"/>
+    <p:sldId id="345" r:id="rId45"/>
+    <p:sldId id="327" r:id="rId46"/>
+    <p:sldId id="326" r:id="rId47"/>
+    <p:sldId id="325" r:id="rId48"/>
+    <p:sldId id="329" r:id="rId49"/>
+    <p:sldId id="330" r:id="rId50"/>
+    <p:sldId id="284" r:id="rId51"/>
+    <p:sldId id="331" r:id="rId52"/>
+    <p:sldId id="334" r:id="rId53"/>
+    <p:sldId id="335" r:id="rId54"/>
+    <p:sldId id="336" r:id="rId55"/>
+    <p:sldId id="337" r:id="rId56"/>
+    <p:sldId id="347" r:id="rId57"/>
   </p:sldIdLst>
   <p:sldSz cx="9144000" cy="6858000" type="screen4x3"/>
   <p:notesSz cx="6858000" cy="9144000"/>
@@ -252,7 +252,7 @@
           <a:p>
             <a:fld id="{3A51E6CB-1B67-49CD-819C-CBD1F8F15839}" type="datetimeFigureOut">
               <a:rPr lang="ko-KR" altLang="en-US" smtClean="0"/>
-              <a:t>2019-09-27</a:t>
+              <a:t>2019-10-02</a:t>
             </a:fld>
             <a:endParaRPr lang="ko-KR" altLang="en-US"/>
           </a:p>
@@ -902,7 +902,7 @@
           <a:p>
             <a:fld id="{1EA80F27-E9B9-4A8E-9A59-01CCB3F43850}" type="datetime1">
               <a:rPr lang="ko-KR" altLang="en-US" smtClean="0"/>
-              <a:t>2019-09-27</a:t>
+              <a:t>2019-10-02</a:t>
             </a:fld>
             <a:endParaRPr lang="ko-KR" altLang="en-US"/>
           </a:p>
@@ -1118,7 +1118,7 @@
           <a:p>
             <a:fld id="{7E5363F8-22A8-407F-82B0-EFC1D1C22895}" type="datetime1">
               <a:rPr lang="ko-KR" altLang="en-US" smtClean="0"/>
-              <a:t>2019-09-27</a:t>
+              <a:t>2019-10-02</a:t>
             </a:fld>
             <a:endParaRPr lang="ko-KR" altLang="en-US"/>
           </a:p>
@@ -1298,7 +1298,7 @@
           <a:p>
             <a:fld id="{8187739B-8E74-4F06-BBD0-F6D670C1F7A1}" type="datetime1">
               <a:rPr lang="ko-KR" altLang="en-US" smtClean="0"/>
-              <a:t>2019-09-27</a:t>
+              <a:t>2019-10-02</a:t>
             </a:fld>
             <a:endParaRPr lang="ko-KR" altLang="en-US"/>
           </a:p>
@@ -1468,7 +1468,7 @@
           <a:p>
             <a:fld id="{947C39E4-F1C0-46F5-93CB-857C8C3AEB8D}" type="datetime1">
               <a:rPr lang="ko-KR" altLang="en-US" smtClean="0"/>
-              <a:t>2019-09-27</a:t>
+              <a:t>2019-10-02</a:t>
             </a:fld>
             <a:endParaRPr lang="ko-KR" altLang="en-US"/>
           </a:p>
@@ -1712,7 +1712,7 @@
           <a:p>
             <a:fld id="{7818271D-E6C7-4286-B2FD-D9AA53F1E428}" type="datetime1">
               <a:rPr lang="ko-KR" altLang="en-US" smtClean="0"/>
-              <a:t>2019-09-27</a:t>
+              <a:t>2019-10-02</a:t>
             </a:fld>
             <a:endParaRPr lang="ko-KR" altLang="en-US"/>
           </a:p>
@@ -1944,7 +1944,7 @@
           <a:p>
             <a:fld id="{8CE3C26B-F624-420D-BF9D-391E2E695B27}" type="datetime1">
               <a:rPr lang="ko-KR" altLang="en-US" smtClean="0"/>
-              <a:t>2019-09-27</a:t>
+              <a:t>2019-10-02</a:t>
             </a:fld>
             <a:endParaRPr lang="ko-KR" altLang="en-US"/>
           </a:p>
@@ -2311,7 +2311,7 @@
           <a:p>
             <a:fld id="{A1FC83CE-7AD5-4A20-9998-54C7F9F05545}" type="datetime1">
               <a:rPr lang="ko-KR" altLang="en-US" smtClean="0"/>
-              <a:t>2019-09-27</a:t>
+              <a:t>2019-10-02</a:t>
             </a:fld>
             <a:endParaRPr lang="ko-KR" altLang="en-US"/>
           </a:p>
@@ -2429,7 +2429,7 @@
           <a:p>
             <a:fld id="{3A3E22EA-EB96-4ADF-ABA9-A693E5F7BB1E}" type="datetime1">
               <a:rPr lang="ko-KR" altLang="en-US" smtClean="0"/>
-              <a:t>2019-09-27</a:t>
+              <a:t>2019-10-02</a:t>
             </a:fld>
             <a:endParaRPr lang="ko-KR" altLang="en-US"/>
           </a:p>
@@ -2524,7 +2524,7 @@
           <a:p>
             <a:fld id="{0D5BD961-86A8-440A-8C4E-52B6CA6FECED}" type="datetime1">
               <a:rPr lang="ko-KR" altLang="en-US" smtClean="0"/>
-              <a:t>2019-09-27</a:t>
+              <a:t>2019-10-02</a:t>
             </a:fld>
             <a:endParaRPr lang="ko-KR" altLang="en-US"/>
           </a:p>
@@ -2801,7 +2801,7 @@
           <a:p>
             <a:fld id="{CD151CC0-1347-483B-8708-01772054FA68}" type="datetime1">
               <a:rPr lang="ko-KR" altLang="en-US" smtClean="0"/>
-              <a:t>2019-09-27</a:t>
+              <a:t>2019-10-02</a:t>
             </a:fld>
             <a:endParaRPr lang="ko-KR" altLang="en-US"/>
           </a:p>
@@ -3058,7 +3058,7 @@
           <a:p>
             <a:fld id="{57185993-49E6-4096-BF26-930E741DA796}" type="datetime1">
               <a:rPr lang="ko-KR" altLang="en-US" smtClean="0"/>
-              <a:t>2019-09-27</a:t>
+              <a:t>2019-10-02</a:t>
             </a:fld>
             <a:endParaRPr lang="ko-KR" altLang="en-US"/>
           </a:p>
@@ -3274,7 +3274,7 @@
           <a:p>
             <a:fld id="{170798F3-F6A9-4876-8D5A-30BE2843F4A2}" type="datetime1">
               <a:rPr lang="ko-KR" altLang="en-US" smtClean="0"/>
-              <a:t>2019-09-27</a:t>
+              <a:t>2019-10-02</a:t>
             </a:fld>
             <a:endParaRPr lang="ko-KR" altLang="en-US"/>
           </a:p>
@@ -10082,7 +10082,9 @@
           </a:xfrm>
         </p:spPr>
         <p:txBody>
-          <a:bodyPr/>
+          <a:bodyPr>
+            <a:normAutofit fontScale="85000" lnSpcReduction="20000"/>
+          </a:bodyPr>
           <a:lstStyle/>
           <a:p>
             <a:r>
@@ -10311,6 +10313,61 @@
               <a:rPr lang="en-US" altLang="ko-KR" dirty="0"/>
               <a:t>: head.jpg</a:t>
             </a:r>
+          </a:p>
+          <a:p>
+            <a:r>
+              <a:rPr lang="ko-KR" altLang="en-US" dirty="0"/>
+              <a:t>제출 기한</a:t>
+            </a:r>
+            <a:r>
+              <a:rPr lang="en-US" altLang="ko-KR" dirty="0"/>
+              <a:t>:</a:t>
+            </a:r>
+          </a:p>
+          <a:p>
+            <a:pPr lvl="1"/>
+            <a:r>
+              <a:rPr lang="en-US" altLang="ko-KR" dirty="0"/>
+              <a:t>10/13 (</a:t>
+            </a:r>
+            <a:r>
+              <a:rPr lang="ko-KR" altLang="en-US" dirty="0"/>
+              <a:t>일</a:t>
+            </a:r>
+            <a:r>
+              <a:rPr lang="en-US" altLang="ko-KR" dirty="0"/>
+              <a:t>) 23:59</a:t>
+            </a:r>
+          </a:p>
+          <a:p>
+            <a:pPr lvl="1"/>
+            <a:r>
+              <a:rPr lang="ko-KR" altLang="en-US" dirty="0"/>
+              <a:t>지각 감점</a:t>
+            </a:r>
+            <a:r>
+              <a:rPr lang="en-US" altLang="ko-KR" dirty="0"/>
+              <a:t>: 5%p / day</a:t>
+            </a:r>
+            <a:r>
+              <a:rPr lang="ko-KR" altLang="en-US" dirty="0"/>
+              <a:t> </a:t>
+            </a:r>
+            <a:r>
+              <a:rPr lang="en-US" altLang="ko-KR" dirty="0"/>
+              <a:t>(3</a:t>
+            </a:r>
+            <a:r>
+              <a:rPr lang="ko-KR" altLang="en-US" dirty="0"/>
+              <a:t>주 내 제출해야 함</a:t>
+            </a:r>
+            <a:r>
+              <a:rPr lang="en-US" altLang="ko-KR" dirty="0"/>
+              <a:t>)</a:t>
+            </a:r>
+          </a:p>
+          <a:p>
+            <a:endParaRPr lang="en-US" altLang="ko-KR" dirty="0"/>
           </a:p>
           <a:p>
             <a:pPr lvl="1"/>
@@ -10487,267 +10544,106 @@
           <a:lstStyle/>
           <a:p>
             <a:r>
-              <a:rPr lang="ko-KR" altLang="en-US" dirty="0"/>
-              <a:t>실습 과제 </a:t>
-            </a:r>
-            <a:r>
-              <a:rPr lang="en-US" altLang="ko-KR" dirty="0"/>
-              <a:t>(</a:t>
-            </a:r>
+              <a:rPr lang="en-US" altLang="ko-KR" dirty="0"/>
+              <a:t>GitHub</a:t>
+            </a:r>
+            <a:r>
+              <a:rPr lang="ko-KR" altLang="en-US" dirty="0"/>
+              <a:t>는</a:t>
+            </a:r>
+            <a:r>
+              <a:rPr lang="en-US" altLang="ko-KR" dirty="0"/>
+              <a:t>?</a:t>
+            </a:r>
+            <a:endParaRPr lang="ko-KR" altLang="en-US" dirty="0"/>
+          </a:p>
+        </p:txBody>
+      </p:sp>
+      <p:sp>
+        <p:nvSpPr>
+          <p:cNvPr id="3" name="내용 개체 틀 2"/>
+          <p:cNvSpPr>
+            <a:spLocks noGrp="1"/>
+          </p:cNvSpPr>
+          <p:nvPr>
+            <p:ph idx="1"/>
+          </p:nvPr>
+        </p:nvSpPr>
+        <p:spPr/>
+        <p:txBody>
+          <a:bodyPr/>
+          <a:lstStyle/>
+          <a:p>
             <a:r>
               <a:rPr lang="en-US" altLang="ko-KR" dirty="0" err="1"/>
-              <a:t>git</a:t>
-            </a:r>
-            <a:r>
-              <a:rPr lang="en-US" altLang="ko-KR" dirty="0"/>
-              <a:t> </a:t>
-            </a:r>
-            <a:r>
-              <a:rPr lang="ko-KR" altLang="en-US" dirty="0"/>
-              <a:t>개인 실습 </a:t>
-            </a:r>
-            <a:r>
-              <a:rPr lang="en-US" altLang="ko-KR" dirty="0"/>
-              <a:t>#2)</a:t>
-            </a:r>
-            <a:endParaRPr lang="ko-KR" altLang="en-US" dirty="0"/>
-          </a:p>
-        </p:txBody>
-      </p:sp>
-      <p:sp>
-        <p:nvSpPr>
-          <p:cNvPr id="3" name="내용 개체 틀 2"/>
-          <p:cNvSpPr>
-            <a:spLocks noGrp="1"/>
-          </p:cNvSpPr>
-          <p:nvPr>
-            <p:ph idx="1"/>
-          </p:nvPr>
-        </p:nvSpPr>
-        <p:spPr>
-          <a:xfrm>
-            <a:off x="395536" y="1058566"/>
-            <a:ext cx="8572618" cy="5269953"/>
-          </a:xfrm>
-        </p:spPr>
-        <p:txBody>
-          <a:bodyPr>
-            <a:normAutofit fontScale="92500" lnSpcReduction="10000"/>
-          </a:bodyPr>
-          <a:lstStyle/>
-          <a:p>
-            <a:r>
-              <a:rPr lang="ko-KR" altLang="en-US" dirty="0"/>
-              <a:t>앞서의 </a:t>
-            </a:r>
-            <a:r>
-              <a:rPr lang="en-US" altLang="ko-KR" dirty="0"/>
-              <a:t>local repo </a:t>
-            </a:r>
-            <a:r>
-              <a:rPr lang="ko-KR" altLang="en-US" dirty="0"/>
-              <a:t>를 </a:t>
-            </a:r>
-            <a:r>
-              <a:rPr lang="en-US" altLang="ko-KR" dirty="0"/>
-              <a:t>GitHub</a:t>
-            </a:r>
-            <a:r>
-              <a:rPr lang="ko-KR" altLang="en-US" dirty="0"/>
-              <a:t>에 업로드</a:t>
+              <a:t>Git</a:t>
+            </a:r>
+            <a:r>
+              <a:rPr lang="ko-KR" altLang="en-US" dirty="0"/>
+              <a:t>의 원격 저장소를 제공</a:t>
             </a:r>
             <a:endParaRPr lang="en-US" altLang="ko-KR" dirty="0"/>
           </a:p>
           <a:p>
+            <a:r>
+              <a:rPr lang="ko-KR" altLang="en-US" dirty="0"/>
+              <a:t>프로젝트 관리 도구 제공</a:t>
+            </a:r>
+            <a:endParaRPr lang="en-US" altLang="ko-KR" dirty="0"/>
+          </a:p>
+          <a:p>
             <a:pPr lvl="1"/>
             <a:r>
-              <a:rPr lang="en-US" altLang="ko-KR" dirty="0"/>
-              <a:t>GitHub </a:t>
-            </a:r>
-            <a:r>
-              <a:rPr lang="ko-KR" altLang="en-US" dirty="0"/>
-              <a:t>프로젝트 페이지 전체 캡처</a:t>
-            </a:r>
-            <a:r>
-              <a:rPr lang="en-US" altLang="ko-KR" dirty="0"/>
-              <a:t>: github.jpg</a:t>
-            </a:r>
-          </a:p>
-          <a:p>
-            <a:r>
-              <a:rPr lang="ko-KR" altLang="en-US" dirty="0"/>
-              <a:t>새로운 </a:t>
-            </a:r>
-            <a:r>
-              <a:rPr lang="en-US" altLang="ko-KR" dirty="0"/>
-              <a:t>local repo </a:t>
-            </a:r>
-            <a:r>
-              <a:rPr lang="ko-KR" altLang="en-US" dirty="0"/>
-              <a:t>를 만들고</a:t>
-            </a:r>
-            <a:r>
-              <a:rPr lang="en-US" altLang="ko-KR" dirty="0"/>
-              <a:t>, clone</a:t>
-            </a:r>
+              <a:rPr lang="ko-KR" altLang="en-US" dirty="0"/>
+              <a:t>위키</a:t>
+            </a:r>
+            <a:r>
+              <a:rPr lang="en-US" altLang="ko-KR" dirty="0"/>
+              <a:t>, </a:t>
+            </a:r>
+            <a:r>
+              <a:rPr lang="ko-KR" altLang="en-US" dirty="0"/>
+              <a:t>이슈관리</a:t>
+            </a:r>
+            <a:r>
+              <a:rPr lang="en-US" altLang="ko-KR" dirty="0"/>
+              <a:t>, </a:t>
+            </a:r>
+            <a:r>
+              <a:rPr lang="ko-KR" altLang="en-US" dirty="0" err="1"/>
+              <a:t>머지</a:t>
+            </a:r>
+            <a:r>
+              <a:rPr lang="ko-KR" altLang="en-US" dirty="0"/>
+              <a:t> 요청 관리</a:t>
+            </a:r>
+            <a:r>
+              <a:rPr lang="en-US" altLang="ko-KR" dirty="0"/>
+              <a:t>, </a:t>
+            </a:r>
+            <a:r>
+              <a:rPr lang="ko-KR" altLang="en-US" dirty="0"/>
+              <a:t>팀원 관리 등 </a:t>
+            </a:r>
+            <a:endParaRPr lang="en-US" altLang="ko-KR" dirty="0"/>
+          </a:p>
+          <a:p>
+            <a:r>
+              <a:rPr lang="ko-KR" altLang="en-US" dirty="0"/>
+              <a:t>비용</a:t>
+            </a:r>
+            <a:endParaRPr lang="en-US" altLang="ko-KR" dirty="0"/>
           </a:p>
           <a:p>
             <a:pPr lvl="1"/>
             <a:r>
-              <a:rPr lang="en-US" altLang="ko-KR" dirty="0"/>
-              <a:t>Local</a:t>
-            </a:r>
-            <a:r>
-              <a:rPr lang="ko-KR" altLang="en-US" dirty="0"/>
-              <a:t> </a:t>
-            </a:r>
-            <a:r>
-              <a:rPr lang="en-US" altLang="ko-KR" dirty="0"/>
-              <a:t>repo</a:t>
-            </a:r>
-            <a:r>
-              <a:rPr lang="ko-KR" altLang="en-US" dirty="0"/>
-              <a:t>의 </a:t>
-            </a:r>
-            <a:r>
-              <a:rPr lang="en-US" altLang="ko-KR" dirty="0"/>
-              <a:t>status, log</a:t>
-            </a:r>
-            <a:r>
-              <a:rPr lang="ko-KR" altLang="en-US" dirty="0"/>
-              <a:t>를 캡처</a:t>
-            </a:r>
-            <a:r>
-              <a:rPr lang="en-US" altLang="ko-KR" dirty="0"/>
-              <a:t>: local_new.jpg</a:t>
-            </a:r>
-          </a:p>
-          <a:p>
-            <a:r>
-              <a:rPr lang="ko-KR" altLang="en-US" dirty="0"/>
-              <a:t>충돌관리 실습</a:t>
+              <a:rPr lang="ko-KR" altLang="en-US" dirty="0"/>
+              <a:t>오픈소스 프로젝트는 무료</a:t>
             </a:r>
             <a:endParaRPr lang="en-US" altLang="ko-KR" dirty="0"/>
           </a:p>
           <a:p>
             <a:pPr lvl="1"/>
-            <a:r>
-              <a:rPr lang="ko-KR" altLang="en-US" dirty="0"/>
-              <a:t>충돌 </a:t>
-            </a:r>
-            <a:r>
-              <a:rPr lang="en-US" altLang="ko-KR" dirty="0"/>
-              <a:t>1</a:t>
-            </a:r>
-          </a:p>
-          <a:p>
-            <a:pPr lvl="2"/>
-            <a:r>
-              <a:rPr lang="ko-KR" altLang="en-US" dirty="0"/>
-              <a:t>새로운 </a:t>
-            </a:r>
-            <a:r>
-              <a:rPr lang="en-US" altLang="ko-KR" dirty="0"/>
-              <a:t>local repo </a:t>
-            </a:r>
-            <a:r>
-              <a:rPr lang="ko-KR" altLang="en-US" dirty="0"/>
-              <a:t>에서 기존 파일 수정 후 </a:t>
-            </a:r>
-            <a:r>
-              <a:rPr lang="en-US" altLang="ko-KR" dirty="0"/>
-              <a:t>push</a:t>
-            </a:r>
-          </a:p>
-          <a:p>
-            <a:pPr lvl="2"/>
-            <a:r>
-              <a:rPr lang="ko-KR" altLang="en-US" dirty="0"/>
-              <a:t>기존 </a:t>
-            </a:r>
-            <a:r>
-              <a:rPr lang="en-US" altLang="ko-KR" dirty="0"/>
-              <a:t>local repo </a:t>
-            </a:r>
-            <a:r>
-              <a:rPr lang="ko-KR" altLang="en-US" dirty="0"/>
-              <a:t>에서 기존 파일 수정 후 </a:t>
-            </a:r>
-            <a:r>
-              <a:rPr lang="en-US" altLang="ko-KR" dirty="0"/>
-              <a:t>push</a:t>
-            </a:r>
-          </a:p>
-          <a:p>
-            <a:pPr lvl="2"/>
-            <a:r>
-              <a:rPr lang="ko-KR" altLang="en-US" dirty="0"/>
-              <a:t>결과 화면 캡처</a:t>
-            </a:r>
-            <a:r>
-              <a:rPr lang="en-US" altLang="ko-KR" dirty="0"/>
-              <a:t>: result1.jpg</a:t>
-            </a:r>
-          </a:p>
-          <a:p>
-            <a:pPr lvl="1"/>
-            <a:r>
-              <a:rPr lang="ko-KR" altLang="en-US" dirty="0"/>
-              <a:t>충돌 </a:t>
-            </a:r>
-            <a:r>
-              <a:rPr lang="en-US" altLang="ko-KR" dirty="0"/>
-              <a:t>2</a:t>
-            </a:r>
-          </a:p>
-          <a:p>
-            <a:pPr lvl="2"/>
-            <a:r>
-              <a:rPr lang="ko-KR" altLang="en-US" dirty="0"/>
-              <a:t>기존 </a:t>
-            </a:r>
-            <a:r>
-              <a:rPr lang="en-US" altLang="ko-KR" dirty="0"/>
-              <a:t>local repo </a:t>
-            </a:r>
-            <a:r>
-              <a:rPr lang="ko-KR" altLang="en-US" dirty="0"/>
-              <a:t>에서 새로운 파일 생성 후 </a:t>
-            </a:r>
-            <a:r>
-              <a:rPr lang="en-US" altLang="ko-KR" dirty="0"/>
-              <a:t>push</a:t>
-            </a:r>
-          </a:p>
-          <a:p>
-            <a:pPr lvl="2"/>
-            <a:r>
-              <a:rPr lang="ko-KR" altLang="en-US" dirty="0"/>
-              <a:t>결과 화면 캡처</a:t>
-            </a:r>
-            <a:r>
-              <a:rPr lang="en-US" altLang="ko-KR" dirty="0"/>
-              <a:t>: result2.jpg</a:t>
-            </a:r>
-          </a:p>
-          <a:p>
-            <a:pPr lvl="1"/>
-            <a:r>
-              <a:rPr lang="ko-KR" altLang="en-US" dirty="0"/>
-              <a:t>해결한 후 화면 및 </a:t>
-            </a:r>
-            <a:r>
-              <a:rPr lang="en-US" altLang="ko-KR" dirty="0"/>
-              <a:t>GitHub commit history</a:t>
-            </a:r>
-            <a:r>
-              <a:rPr lang="ko-KR" altLang="en-US" dirty="0"/>
-              <a:t>캡처</a:t>
-            </a:r>
-            <a:r>
-              <a:rPr lang="en-US" altLang="ko-KR" dirty="0"/>
-              <a:t>: result3.jpg history.jpg</a:t>
-            </a:r>
             <a:endParaRPr lang="ko-KR" altLang="en-US" dirty="0"/>
           </a:p>
         </p:txBody>
@@ -10775,10 +10671,34 @@
           </a:p>
         </p:txBody>
       </p:sp>
+      <p:pic>
+        <p:nvPicPr>
+          <p:cNvPr id="5" name="그림 4"/>
+          <p:cNvPicPr>
+            <a:picLocks noChangeAspect="1"/>
+          </p:cNvPicPr>
+          <p:nvPr/>
+        </p:nvPicPr>
+        <p:blipFill>
+          <a:blip r:embed="rId2"/>
+          <a:stretch>
+            <a:fillRect/>
+          </a:stretch>
+        </p:blipFill>
+        <p:spPr>
+          <a:xfrm>
+            <a:off x="1160586" y="3801048"/>
+            <a:ext cx="6497515" cy="2381768"/>
+          </a:xfrm>
+          <a:prstGeom prst="rect">
+            <a:avLst/>
+          </a:prstGeom>
+        </p:spPr>
+      </p:pic>
     </p:spTree>
     <p:extLst>
       <p:ext uri="{BB962C8B-B14F-4D97-AF65-F5344CB8AC3E}">
-        <p14:creationId xmlns:p14="http://schemas.microsoft.com/office/powerpoint/2010/main" val="988835397"/>
+        <p14:creationId xmlns:p14="http://schemas.microsoft.com/office/powerpoint/2010/main" val="3963838777"/>
       </p:ext>
     </p:extLst>
   </p:cSld>
@@ -10989,203 +10909,6 @@
       </p:grpSpPr>
       <p:sp>
         <p:nvSpPr>
-          <p:cNvPr id="2" name="제목 1"/>
-          <p:cNvSpPr>
-            <a:spLocks noGrp="1"/>
-          </p:cNvSpPr>
-          <p:nvPr>
-            <p:ph type="title"/>
-          </p:nvPr>
-        </p:nvSpPr>
-        <p:spPr/>
-        <p:txBody>
-          <a:bodyPr/>
-          <a:lstStyle/>
-          <a:p>
-            <a:r>
-              <a:rPr lang="en-US" altLang="ko-KR" dirty="0"/>
-              <a:t>GitHub</a:t>
-            </a:r>
-            <a:r>
-              <a:rPr lang="ko-KR" altLang="en-US" dirty="0"/>
-              <a:t>는</a:t>
-            </a:r>
-            <a:r>
-              <a:rPr lang="en-US" altLang="ko-KR" dirty="0"/>
-              <a:t>?</a:t>
-            </a:r>
-            <a:endParaRPr lang="ko-KR" altLang="en-US" dirty="0"/>
-          </a:p>
-        </p:txBody>
-      </p:sp>
-      <p:sp>
-        <p:nvSpPr>
-          <p:cNvPr id="3" name="내용 개체 틀 2"/>
-          <p:cNvSpPr>
-            <a:spLocks noGrp="1"/>
-          </p:cNvSpPr>
-          <p:nvPr>
-            <p:ph idx="1"/>
-          </p:nvPr>
-        </p:nvSpPr>
-        <p:spPr/>
-        <p:txBody>
-          <a:bodyPr/>
-          <a:lstStyle/>
-          <a:p>
-            <a:r>
-              <a:rPr lang="en-US" altLang="ko-KR" dirty="0" err="1"/>
-              <a:t>Git</a:t>
-            </a:r>
-            <a:r>
-              <a:rPr lang="ko-KR" altLang="en-US" dirty="0"/>
-              <a:t>의 원격 저장소를 제공</a:t>
-            </a:r>
-            <a:endParaRPr lang="en-US" altLang="ko-KR" dirty="0"/>
-          </a:p>
-          <a:p>
-            <a:r>
-              <a:rPr lang="ko-KR" altLang="en-US" dirty="0"/>
-              <a:t>프로젝트 관리 도구 제공</a:t>
-            </a:r>
-            <a:endParaRPr lang="en-US" altLang="ko-KR" dirty="0"/>
-          </a:p>
-          <a:p>
-            <a:pPr lvl="1"/>
-            <a:r>
-              <a:rPr lang="ko-KR" altLang="en-US" dirty="0"/>
-              <a:t>위키</a:t>
-            </a:r>
-            <a:r>
-              <a:rPr lang="en-US" altLang="ko-KR" dirty="0"/>
-              <a:t>, </a:t>
-            </a:r>
-            <a:r>
-              <a:rPr lang="ko-KR" altLang="en-US" dirty="0"/>
-              <a:t>이슈관리</a:t>
-            </a:r>
-            <a:r>
-              <a:rPr lang="en-US" altLang="ko-KR" dirty="0"/>
-              <a:t>, </a:t>
-            </a:r>
-            <a:r>
-              <a:rPr lang="ko-KR" altLang="en-US" dirty="0" err="1"/>
-              <a:t>머지</a:t>
-            </a:r>
-            <a:r>
-              <a:rPr lang="ko-KR" altLang="en-US" dirty="0"/>
-              <a:t> 요청 관리</a:t>
-            </a:r>
-            <a:r>
-              <a:rPr lang="en-US" altLang="ko-KR" dirty="0"/>
-              <a:t>, </a:t>
-            </a:r>
-            <a:r>
-              <a:rPr lang="ko-KR" altLang="en-US" dirty="0"/>
-              <a:t>팀원 관리 등 </a:t>
-            </a:r>
-            <a:endParaRPr lang="en-US" altLang="ko-KR" dirty="0"/>
-          </a:p>
-          <a:p>
-            <a:r>
-              <a:rPr lang="ko-KR" altLang="en-US" dirty="0"/>
-              <a:t>비용</a:t>
-            </a:r>
-            <a:endParaRPr lang="en-US" altLang="ko-KR" dirty="0"/>
-          </a:p>
-          <a:p>
-            <a:pPr lvl="1"/>
-            <a:r>
-              <a:rPr lang="ko-KR" altLang="en-US" dirty="0"/>
-              <a:t>오픈소스 프로젝트는 무료</a:t>
-            </a:r>
-            <a:endParaRPr lang="en-US" altLang="ko-KR" dirty="0"/>
-          </a:p>
-          <a:p>
-            <a:pPr lvl="1"/>
-            <a:endParaRPr lang="ko-KR" altLang="en-US" dirty="0"/>
-          </a:p>
-        </p:txBody>
-      </p:sp>
-      <p:sp>
-        <p:nvSpPr>
-          <p:cNvPr id="4" name="슬라이드 번호 개체 틀 3"/>
-          <p:cNvSpPr>
-            <a:spLocks noGrp="1"/>
-          </p:cNvSpPr>
-          <p:nvPr>
-            <p:ph type="sldNum" sz="quarter" idx="12"/>
-          </p:nvPr>
-        </p:nvSpPr>
-        <p:spPr/>
-        <p:txBody>
-          <a:bodyPr/>
-          <a:lstStyle/>
-          <a:p>
-            <a:fld id="{64F0D409-D3F6-4EEC-8C77-1F5E89989FFB}" type="slidenum">
-              <a:rPr lang="ko-KR" altLang="en-US" smtClean="0"/>
-              <a:t>40</a:t>
-            </a:fld>
-            <a:endParaRPr lang="ko-KR" altLang="en-US"/>
-          </a:p>
-        </p:txBody>
-      </p:sp>
-      <p:pic>
-        <p:nvPicPr>
-          <p:cNvPr id="5" name="그림 4"/>
-          <p:cNvPicPr>
-            <a:picLocks noChangeAspect="1"/>
-          </p:cNvPicPr>
-          <p:nvPr/>
-        </p:nvPicPr>
-        <p:blipFill>
-          <a:blip r:embed="rId2"/>
-          <a:stretch>
-            <a:fillRect/>
-          </a:stretch>
-        </p:blipFill>
-        <p:spPr>
-          <a:xfrm>
-            <a:off x="1160586" y="3801048"/>
-            <a:ext cx="6497515" cy="2381768"/>
-          </a:xfrm>
-          <a:prstGeom prst="rect">
-            <a:avLst/>
-          </a:prstGeom>
-        </p:spPr>
-      </p:pic>
-    </p:spTree>
-    <p:extLst>
-      <p:ext uri="{BB962C8B-B14F-4D97-AF65-F5344CB8AC3E}">
-        <p14:creationId xmlns:p14="http://schemas.microsoft.com/office/powerpoint/2010/main" val="3963838777"/>
-      </p:ext>
-    </p:extLst>
-  </p:cSld>
-  <p:clrMapOvr>
-    <a:masterClrMapping/>
-  </p:clrMapOvr>
-</p:sld>
-</file>
-
-<file path=ppt/slides/slide41.xml><?xml version="1.0" encoding="utf-8"?>
-<p:sld xmlns:a="http://schemas.openxmlformats.org/drawingml/2006/main" xmlns:r="http://schemas.openxmlformats.org/officeDocument/2006/relationships" xmlns:p="http://schemas.openxmlformats.org/presentationml/2006/main">
-  <p:cSld>
-    <p:spTree>
-      <p:nvGrpSpPr>
-        <p:cNvPr id="1" name=""/>
-        <p:cNvGrpSpPr/>
-        <p:nvPr/>
-      </p:nvGrpSpPr>
-      <p:grpSpPr>
-        <a:xfrm>
-          <a:off x="0" y="0"/>
-          <a:ext cx="0" cy="0"/>
-          <a:chOff x="0" y="0"/>
-          <a:chExt cx="0" cy="0"/>
-        </a:xfrm>
-      </p:grpSpPr>
-      <p:sp>
-        <p:nvSpPr>
           <p:cNvPr id="5" name="제목 4"/>
           <p:cNvSpPr>
             <a:spLocks noGrp="1"/>
@@ -11255,7 +10978,7 @@
           <a:p>
             <a:fld id="{64F0D409-D3F6-4EEC-8C77-1F5E89989FFB}" type="slidenum">
               <a:rPr lang="ko-KR" altLang="en-US" smtClean="0"/>
-              <a:t>41</a:t>
+              <a:t>40</a:t>
             </a:fld>
             <a:endParaRPr lang="ko-KR" altLang="en-US"/>
           </a:p>
@@ -11298,6 +11021,140 @@
 </p:sld>
 </file>
 
+<file path=ppt/slides/slide41.xml><?xml version="1.0" encoding="utf-8"?>
+<p:sld xmlns:a="http://schemas.openxmlformats.org/drawingml/2006/main" xmlns:r="http://schemas.openxmlformats.org/officeDocument/2006/relationships" xmlns:p="http://schemas.openxmlformats.org/presentationml/2006/main">
+  <p:cSld>
+    <p:spTree>
+      <p:nvGrpSpPr>
+        <p:cNvPr id="1" name=""/>
+        <p:cNvGrpSpPr/>
+        <p:nvPr/>
+      </p:nvGrpSpPr>
+      <p:grpSpPr>
+        <a:xfrm>
+          <a:off x="0" y="0"/>
+          <a:ext cx="0" cy="0"/>
+          <a:chOff x="0" y="0"/>
+          <a:chExt cx="0" cy="0"/>
+        </a:xfrm>
+      </p:grpSpPr>
+      <p:sp>
+        <p:nvSpPr>
+          <p:cNvPr id="5" name="제목 4"/>
+          <p:cNvSpPr>
+            <a:spLocks noGrp="1"/>
+          </p:cNvSpPr>
+          <p:nvPr>
+            <p:ph type="title"/>
+          </p:nvPr>
+        </p:nvSpPr>
+        <p:spPr/>
+        <p:txBody>
+          <a:bodyPr/>
+          <a:lstStyle/>
+          <a:p>
+            <a:r>
+              <a:rPr lang="en-US" altLang="ko-KR" dirty="0"/>
+              <a:t>GitHub </a:t>
+            </a:r>
+            <a:r>
+              <a:rPr lang="ko-KR" altLang="en-US" dirty="0" err="1"/>
+              <a:t>학생용</a:t>
+            </a:r>
+            <a:r>
+              <a:rPr lang="en-US" altLang="ko-KR" dirty="0"/>
+              <a:t>:</a:t>
+            </a:r>
+            <a:r>
+              <a:rPr lang="ko-KR" altLang="en-US" dirty="0"/>
+              <a:t> </a:t>
+            </a:r>
+            <a:r>
+              <a:rPr lang="en-US" altLang="ko-KR" dirty="0"/>
+              <a:t>free</a:t>
+            </a:r>
+            <a:r>
+              <a:rPr lang="ko-KR" altLang="en-US" dirty="0"/>
+              <a:t> </a:t>
+            </a:r>
+            <a:r>
+              <a:rPr lang="en-US" altLang="ko-KR" dirty="0"/>
+              <a:t>private</a:t>
+            </a:r>
+            <a:r>
+              <a:rPr lang="ko-KR" altLang="en-US" dirty="0"/>
+              <a:t> </a:t>
+            </a:r>
+            <a:r>
+              <a:rPr lang="en-US" altLang="ko-KR" dirty="0"/>
+              <a:t>repository</a:t>
+            </a:r>
+            <a:endParaRPr lang="ko-KR" altLang="en-US" dirty="0"/>
+          </a:p>
+        </p:txBody>
+      </p:sp>
+      <p:pic>
+        <p:nvPicPr>
+          <p:cNvPr id="7" name="내용 개체 틀 6"/>
+          <p:cNvPicPr>
+            <a:picLocks noGrp="1" noChangeAspect="1"/>
+          </p:cNvPicPr>
+          <p:nvPr>
+            <p:ph idx="1"/>
+          </p:nvPr>
+        </p:nvPicPr>
+        <p:blipFill>
+          <a:blip r:embed="rId2"/>
+          <a:stretch>
+            <a:fillRect/>
+          </a:stretch>
+        </p:blipFill>
+        <p:spPr>
+          <a:xfrm>
+            <a:off x="395288" y="1162871"/>
+            <a:ext cx="8353425" cy="5060895"/>
+          </a:xfrm>
+          <a:prstGeom prst="rect">
+            <a:avLst/>
+          </a:prstGeom>
+        </p:spPr>
+      </p:pic>
+      <p:sp>
+        <p:nvSpPr>
+          <p:cNvPr id="4" name="슬라이드 번호 개체 틀 3"/>
+          <p:cNvSpPr>
+            <a:spLocks noGrp="1"/>
+          </p:cNvSpPr>
+          <p:nvPr>
+            <p:ph type="sldNum" sz="quarter" idx="12"/>
+          </p:nvPr>
+        </p:nvSpPr>
+        <p:spPr/>
+        <p:txBody>
+          <a:bodyPr/>
+          <a:lstStyle/>
+          <a:p>
+            <a:fld id="{64F0D409-D3F6-4EEC-8C77-1F5E89989FFB}" type="slidenum">
+              <a:rPr lang="ko-KR" altLang="en-US" smtClean="0"/>
+              <a:t>41</a:t>
+            </a:fld>
+            <a:endParaRPr lang="ko-KR" altLang="en-US"/>
+          </a:p>
+        </p:txBody>
+      </p:sp>
+    </p:spTree>
+    <p:extLst>
+      <p:ext uri="{BB962C8B-B14F-4D97-AF65-F5344CB8AC3E}">
+        <p14:creationId xmlns:p14="http://schemas.microsoft.com/office/powerpoint/2010/main" val="868467643"/>
+      </p:ext>
+    </p:extLst>
+  </p:cSld>
+  <p:clrMapOvr>
+    <a:masterClrMapping/>
+  </p:clrMapOvr>
+</p:sld>
+</file>
+
 <file path=ppt/slides/slide42.xml><?xml version="1.0" encoding="utf-8"?>
 <p:sld xmlns:a="http://schemas.openxmlformats.org/drawingml/2006/main" xmlns:r="http://schemas.openxmlformats.org/officeDocument/2006/relationships" xmlns:p="http://schemas.openxmlformats.org/presentationml/2006/main">
   <p:cSld>
@@ -11317,7 +11174,7 @@
       </p:grpSpPr>
       <p:sp>
         <p:nvSpPr>
-          <p:cNvPr id="5" name="제목 4"/>
+          <p:cNvPr id="2" name="제목 1"/>
           <p:cNvSpPr>
             <a:spLocks noGrp="1"/>
           </p:cNvSpPr>
@@ -11332,41 +11189,35 @@
           <a:p>
             <a:r>
               <a:rPr lang="en-US" altLang="ko-KR" dirty="0"/>
-              <a:t>GitHub </a:t>
-            </a:r>
-            <a:r>
-              <a:rPr lang="ko-KR" altLang="en-US" dirty="0" err="1"/>
-              <a:t>학생용</a:t>
-            </a:r>
-            <a:r>
-              <a:rPr lang="en-US" altLang="ko-KR" dirty="0"/>
-              <a:t>:</a:t>
-            </a:r>
-            <a:r>
-              <a:rPr lang="ko-KR" altLang="en-US" dirty="0"/>
-              <a:t> </a:t>
-            </a:r>
-            <a:r>
-              <a:rPr lang="en-US" altLang="ko-KR" dirty="0"/>
-              <a:t>free</a:t>
-            </a:r>
-            <a:r>
-              <a:rPr lang="ko-KR" altLang="en-US" dirty="0"/>
-              <a:t> </a:t>
-            </a:r>
-            <a:r>
-              <a:rPr lang="en-US" altLang="ko-KR" dirty="0"/>
-              <a:t>private</a:t>
-            </a:r>
-            <a:r>
-              <a:rPr lang="ko-KR" altLang="en-US" dirty="0"/>
-              <a:t> </a:t>
-            </a:r>
-            <a:r>
-              <a:rPr lang="en-US" altLang="ko-KR" dirty="0"/>
-              <a:t>repository</a:t>
-            </a:r>
-            <a:endParaRPr lang="ko-KR" altLang="en-US" dirty="0"/>
+              <a:t>Repository </a:t>
+            </a:r>
+            <a:r>
+              <a:rPr lang="ko-KR" altLang="en-US" dirty="0"/>
+              <a:t>생성</a:t>
+            </a:r>
+          </a:p>
+        </p:txBody>
+      </p:sp>
+      <p:sp>
+        <p:nvSpPr>
+          <p:cNvPr id="4" name="슬라이드 번호 개체 틀 3"/>
+          <p:cNvSpPr>
+            <a:spLocks noGrp="1"/>
+          </p:cNvSpPr>
+          <p:nvPr>
+            <p:ph type="sldNum" sz="quarter" idx="12"/>
+          </p:nvPr>
+        </p:nvSpPr>
+        <p:spPr/>
+        <p:txBody>
+          <a:bodyPr/>
+          <a:lstStyle/>
+          <a:p>
+            <a:fld id="{64F0D409-D3F6-4EEC-8C77-1F5E89989FFB}" type="slidenum">
+              <a:rPr lang="ko-KR" altLang="en-US" smtClean="0"/>
+              <a:t>42</a:t>
+            </a:fld>
+            <a:endParaRPr lang="ko-KR" altLang="en-US"/>
           </a:p>
         </p:txBody>
       </p:sp>
@@ -11388,8 +11239,8 @@
         </p:blipFill>
         <p:spPr>
           <a:xfrm>
-            <a:off x="395288" y="1162871"/>
-            <a:ext cx="8353425" cy="5060895"/>
+            <a:off x="1409751" y="1058863"/>
+            <a:ext cx="6324498" cy="5268912"/>
           </a:xfrm>
           <a:prstGeom prst="rect">
             <a:avLst/>
@@ -11398,31 +11249,107 @@
       </p:pic>
       <p:sp>
         <p:nvSpPr>
-          <p:cNvPr id="4" name="슬라이드 번호 개체 틀 3"/>
-          <p:cNvSpPr>
-            <a:spLocks noGrp="1"/>
-          </p:cNvSpPr>
-          <p:nvPr>
-            <p:ph type="sldNum" sz="quarter" idx="12"/>
-          </p:nvPr>
-        </p:nvSpPr>
-        <p:spPr/>
-        <p:txBody>
-          <a:bodyPr/>
-          <a:lstStyle/>
-          <a:p>
-            <a:fld id="{64F0D409-D3F6-4EEC-8C77-1F5E89989FFB}" type="slidenum">
-              <a:rPr lang="ko-KR" altLang="en-US" smtClean="0"/>
-              <a:t>42</a:t>
-            </a:fld>
+          <p:cNvPr id="5" name="직사각형 4">
+            <a:extLst>
+              <a:ext uri="{FF2B5EF4-FFF2-40B4-BE49-F238E27FC236}">
+                <a16:creationId xmlns:a16="http://schemas.microsoft.com/office/drawing/2014/main" id="{D7C2FDB5-5C4F-4B20-A891-8E151F8F3933}"/>
+              </a:ext>
+            </a:extLst>
+          </p:cNvPr>
+          <p:cNvSpPr/>
+          <p:nvPr/>
+        </p:nvSpPr>
+        <p:spPr>
+          <a:xfrm>
+            <a:off x="1329852" y="4939593"/>
+            <a:ext cx="7032913" cy="870440"/>
+          </a:xfrm>
+          <a:prstGeom prst="rect">
+            <a:avLst/>
+          </a:prstGeom>
+          <a:noFill/>
+          <a:ln w="38100">
+            <a:solidFill>
+              <a:srgbClr val="FF0000"/>
+            </a:solidFill>
+          </a:ln>
+        </p:spPr>
+        <p:style>
+          <a:lnRef idx="2">
+            <a:schemeClr val="accent1">
+              <a:shade val="50000"/>
+            </a:schemeClr>
+          </a:lnRef>
+          <a:fillRef idx="1">
+            <a:schemeClr val="accent1"/>
+          </a:fillRef>
+          <a:effectRef idx="0">
+            <a:schemeClr val="accent1"/>
+          </a:effectRef>
+          <a:fontRef idx="minor">
+            <a:schemeClr val="lt1"/>
+          </a:fontRef>
+        </p:style>
+        <p:txBody>
+          <a:bodyPr rtlCol="0" anchor="ctr"/>
+          <a:lstStyle/>
+          <a:p>
+            <a:pPr algn="ctr"/>
             <a:endParaRPr lang="ko-KR" altLang="en-US"/>
+          </a:p>
+        </p:txBody>
+      </p:sp>
+      <p:sp>
+        <p:nvSpPr>
+          <p:cNvPr id="6" name="직사각형 5">
+            <a:extLst>
+              <a:ext uri="{FF2B5EF4-FFF2-40B4-BE49-F238E27FC236}">
+                <a16:creationId xmlns:a16="http://schemas.microsoft.com/office/drawing/2014/main" id="{3935294F-7598-4519-91D8-E3C312CD78BD}"/>
+              </a:ext>
+            </a:extLst>
+          </p:cNvPr>
+          <p:cNvSpPr/>
+          <p:nvPr/>
+        </p:nvSpPr>
+        <p:spPr>
+          <a:xfrm>
+            <a:off x="4518732" y="5429805"/>
+            <a:ext cx="3996618" cy="369332"/>
+          </a:xfrm>
+          <a:prstGeom prst="rect">
+            <a:avLst/>
+          </a:prstGeom>
+        </p:spPr>
+        <p:txBody>
+          <a:bodyPr wrap="square">
+            <a:spAutoFit/>
+          </a:bodyPr>
+          <a:lstStyle/>
+          <a:p>
+            <a:r>
+              <a:rPr lang="en-US" altLang="ko-KR" dirty="0"/>
+              <a:t>* </a:t>
+            </a:r>
+            <a:r>
+              <a:rPr lang="ko-KR" altLang="en-US" dirty="0"/>
+              <a:t>둘 모두 </a:t>
+            </a:r>
+            <a:r>
+              <a:rPr lang="en-US" altLang="ko-KR" dirty="0"/>
+              <a:t>None, README </a:t>
+            </a:r>
+            <a:r>
+              <a:rPr lang="ko-KR" altLang="en-US" dirty="0"/>
+              <a:t>만들지 말 것</a:t>
+            </a:r>
+            <a:endParaRPr lang="en-US" altLang="ko-KR" dirty="0"/>
           </a:p>
         </p:txBody>
       </p:sp>
     </p:spTree>
     <p:extLst>
       <p:ext uri="{BB962C8B-B14F-4D97-AF65-F5344CB8AC3E}">
-        <p14:creationId xmlns:p14="http://schemas.microsoft.com/office/powerpoint/2010/main" val="868467643"/>
+        <p14:creationId xmlns:p14="http://schemas.microsoft.com/office/powerpoint/2010/main" val="2114022825"/>
       </p:ext>
     </p:extLst>
   </p:cSld>
@@ -11470,111 +11397,6 @@
             </a:r>
             <a:r>
               <a:rPr lang="ko-KR" altLang="en-US" dirty="0"/>
-              <a:t>생성</a:t>
-            </a:r>
-          </a:p>
-        </p:txBody>
-      </p:sp>
-      <p:sp>
-        <p:nvSpPr>
-          <p:cNvPr id="4" name="슬라이드 번호 개체 틀 3"/>
-          <p:cNvSpPr>
-            <a:spLocks noGrp="1"/>
-          </p:cNvSpPr>
-          <p:nvPr>
-            <p:ph type="sldNum" sz="quarter" idx="12"/>
-          </p:nvPr>
-        </p:nvSpPr>
-        <p:spPr/>
-        <p:txBody>
-          <a:bodyPr/>
-          <a:lstStyle/>
-          <a:p>
-            <a:fld id="{64F0D409-D3F6-4EEC-8C77-1F5E89989FFB}" type="slidenum">
-              <a:rPr lang="ko-KR" altLang="en-US" smtClean="0"/>
-              <a:t>43</a:t>
-            </a:fld>
-            <a:endParaRPr lang="ko-KR" altLang="en-US"/>
-          </a:p>
-        </p:txBody>
-      </p:sp>
-      <p:pic>
-        <p:nvPicPr>
-          <p:cNvPr id="7" name="내용 개체 틀 6"/>
-          <p:cNvPicPr>
-            <a:picLocks noGrp="1" noChangeAspect="1"/>
-          </p:cNvPicPr>
-          <p:nvPr>
-            <p:ph idx="1"/>
-          </p:nvPr>
-        </p:nvPicPr>
-        <p:blipFill>
-          <a:blip r:embed="rId2"/>
-          <a:stretch>
-            <a:fillRect/>
-          </a:stretch>
-        </p:blipFill>
-        <p:spPr>
-          <a:xfrm>
-            <a:off x="1409751" y="1058863"/>
-            <a:ext cx="6324498" cy="5268912"/>
-          </a:xfrm>
-          <a:prstGeom prst="rect">
-            <a:avLst/>
-          </a:prstGeom>
-        </p:spPr>
-      </p:pic>
-    </p:spTree>
-    <p:extLst>
-      <p:ext uri="{BB962C8B-B14F-4D97-AF65-F5344CB8AC3E}">
-        <p14:creationId xmlns:p14="http://schemas.microsoft.com/office/powerpoint/2010/main" val="2114022825"/>
-      </p:ext>
-    </p:extLst>
-  </p:cSld>
-  <p:clrMapOvr>
-    <a:masterClrMapping/>
-  </p:clrMapOvr>
-</p:sld>
-</file>
-
-<file path=ppt/slides/slide44.xml><?xml version="1.0" encoding="utf-8"?>
-<p:sld xmlns:a="http://schemas.openxmlformats.org/drawingml/2006/main" xmlns:r="http://schemas.openxmlformats.org/officeDocument/2006/relationships" xmlns:p="http://schemas.openxmlformats.org/presentationml/2006/main">
-  <p:cSld>
-    <p:spTree>
-      <p:nvGrpSpPr>
-        <p:cNvPr id="1" name=""/>
-        <p:cNvGrpSpPr/>
-        <p:nvPr/>
-      </p:nvGrpSpPr>
-      <p:grpSpPr>
-        <a:xfrm>
-          <a:off x="0" y="0"/>
-          <a:ext cx="0" cy="0"/>
-          <a:chOff x="0" y="0"/>
-          <a:chExt cx="0" cy="0"/>
-        </a:xfrm>
-      </p:grpSpPr>
-      <p:sp>
-        <p:nvSpPr>
-          <p:cNvPr id="2" name="제목 1"/>
-          <p:cNvSpPr>
-            <a:spLocks noGrp="1"/>
-          </p:cNvSpPr>
-          <p:nvPr>
-            <p:ph type="title"/>
-          </p:nvPr>
-        </p:nvSpPr>
-        <p:spPr/>
-        <p:txBody>
-          <a:bodyPr/>
-          <a:lstStyle/>
-          <a:p>
-            <a:r>
-              <a:rPr lang="en-US" altLang="ko-KR" dirty="0"/>
-              <a:t>Repository </a:t>
-            </a:r>
-            <a:r>
-              <a:rPr lang="ko-KR" altLang="en-US" dirty="0"/>
               <a:t>생성 후</a:t>
             </a:r>
           </a:p>
@@ -11623,7 +11445,7 @@
           <a:p>
             <a:fld id="{64F0D409-D3F6-4EEC-8C77-1F5E89989FFB}" type="slidenum">
               <a:rPr lang="ko-KR" altLang="en-US" smtClean="0"/>
-              <a:t>44</a:t>
+              <a:t>43</a:t>
             </a:fld>
             <a:endParaRPr lang="ko-KR" altLang="en-US"/>
           </a:p>
@@ -11688,6 +11510,115 @@
 </p:sld>
 </file>
 
+<file path=ppt/slides/slide44.xml><?xml version="1.0" encoding="utf-8"?>
+<p:sld xmlns:a="http://schemas.openxmlformats.org/drawingml/2006/main" xmlns:r="http://schemas.openxmlformats.org/officeDocument/2006/relationships" xmlns:p="http://schemas.openxmlformats.org/presentationml/2006/main">
+  <p:cSld>
+    <p:spTree>
+      <p:nvGrpSpPr>
+        <p:cNvPr id="1" name=""/>
+        <p:cNvGrpSpPr/>
+        <p:nvPr/>
+      </p:nvGrpSpPr>
+      <p:grpSpPr>
+        <a:xfrm>
+          <a:off x="0" y="0"/>
+          <a:ext cx="0" cy="0"/>
+          <a:chOff x="0" y="0"/>
+          <a:chExt cx="0" cy="0"/>
+        </a:xfrm>
+      </p:grpSpPr>
+      <p:sp>
+        <p:nvSpPr>
+          <p:cNvPr id="2" name="제목 1"/>
+          <p:cNvSpPr>
+            <a:spLocks noGrp="1"/>
+          </p:cNvSpPr>
+          <p:nvPr>
+            <p:ph type="title"/>
+          </p:nvPr>
+        </p:nvSpPr>
+        <p:spPr/>
+        <p:txBody>
+          <a:bodyPr/>
+          <a:lstStyle/>
+          <a:p>
+            <a:r>
+              <a:rPr lang="ko-KR" altLang="en-US" dirty="0"/>
+              <a:t>로컬 </a:t>
+            </a:r>
+            <a:r>
+              <a:rPr lang="en-US" altLang="ko-KR" dirty="0"/>
+              <a:t>– </a:t>
+            </a:r>
+            <a:r>
+              <a:rPr lang="ko-KR" altLang="en-US" dirty="0"/>
+              <a:t>원격 저장소 간의 이동</a:t>
+            </a:r>
+          </a:p>
+        </p:txBody>
+      </p:sp>
+      <p:pic>
+        <p:nvPicPr>
+          <p:cNvPr id="5" name="내용 개체 틀 4"/>
+          <p:cNvPicPr>
+            <a:picLocks noGrp="1" noChangeAspect="1"/>
+          </p:cNvPicPr>
+          <p:nvPr>
+            <p:ph idx="1"/>
+          </p:nvPr>
+        </p:nvPicPr>
+        <p:blipFill>
+          <a:blip r:embed="rId2"/>
+          <a:stretch>
+            <a:fillRect/>
+          </a:stretch>
+        </p:blipFill>
+        <p:spPr>
+          <a:xfrm>
+            <a:off x="1084096" y="1058863"/>
+            <a:ext cx="6975809" cy="5268912"/>
+          </a:xfrm>
+          <a:prstGeom prst="rect">
+            <a:avLst/>
+          </a:prstGeom>
+        </p:spPr>
+      </p:pic>
+      <p:sp>
+        <p:nvSpPr>
+          <p:cNvPr id="4" name="슬라이드 번호 개체 틀 3"/>
+          <p:cNvSpPr>
+            <a:spLocks noGrp="1"/>
+          </p:cNvSpPr>
+          <p:nvPr>
+            <p:ph type="sldNum" sz="quarter" idx="12"/>
+          </p:nvPr>
+        </p:nvSpPr>
+        <p:spPr/>
+        <p:txBody>
+          <a:bodyPr/>
+          <a:lstStyle/>
+          <a:p>
+            <a:fld id="{64F0D409-D3F6-4EEC-8C77-1F5E89989FFB}" type="slidenum">
+              <a:rPr lang="ko-KR" altLang="en-US" smtClean="0"/>
+              <a:t>44</a:t>
+            </a:fld>
+            <a:endParaRPr lang="ko-KR" altLang="en-US"/>
+          </a:p>
+        </p:txBody>
+      </p:sp>
+    </p:spTree>
+    <p:extLst>
+      <p:ext uri="{BB962C8B-B14F-4D97-AF65-F5344CB8AC3E}">
+        <p14:creationId xmlns:p14="http://schemas.microsoft.com/office/powerpoint/2010/main" val="1011965140"/>
+      </p:ext>
+    </p:extLst>
+  </p:cSld>
+  <p:clrMapOvr>
+    <a:masterClrMapping/>
+  </p:clrMapOvr>
+</p:sld>
+</file>
+
 <file path=ppt/slides/slide45.xml><?xml version="1.0" encoding="utf-8"?>
 <p:sld xmlns:a="http://schemas.openxmlformats.org/drawingml/2006/main" xmlns:r="http://schemas.openxmlformats.org/officeDocument/2006/relationships" xmlns:p="http://schemas.openxmlformats.org/presentationml/2006/main">
   <p:cSld>
@@ -11717,21 +11648,32 @@
         </p:nvSpPr>
         <p:spPr/>
         <p:txBody>
-          <a:bodyPr/>
-          <a:lstStyle/>
-          <a:p>
-            <a:r>
-              <a:rPr lang="ko-KR" altLang="en-US" dirty="0"/>
-              <a:t>로컬 </a:t>
-            </a:r>
-            <a:r>
-              <a:rPr lang="en-US" altLang="ko-KR" dirty="0"/>
-              <a:t>– </a:t>
-            </a:r>
-            <a:r>
-              <a:rPr lang="ko-KR" altLang="en-US" dirty="0"/>
-              <a:t>원격 저장소 간의 이동</a:t>
-            </a:r>
+          <a:bodyPr>
+            <a:normAutofit/>
+          </a:bodyPr>
+          <a:lstStyle/>
+          <a:p>
+            <a:r>
+              <a:rPr lang="en-US" altLang="ko-KR" dirty="0"/>
+              <a:t>Local repository </a:t>
+            </a:r>
+            <a:r>
+              <a:rPr lang="ko-KR" altLang="en-US" dirty="0"/>
+              <a:t>를 </a:t>
+            </a:r>
+            <a:r>
+              <a:rPr lang="en-US" altLang="ko-KR" dirty="0"/>
+              <a:t>GitHub remote</a:t>
+            </a:r>
+            <a:r>
+              <a:rPr lang="ko-KR" altLang="en-US" dirty="0"/>
+              <a:t>로 </a:t>
+            </a:r>
+            <a:r>
+              <a:rPr lang="en-US" altLang="ko-KR" dirty="0"/>
+              <a:t>push</a:t>
+            </a:r>
+            <a:endParaRPr lang="ko-KR" altLang="en-US" dirty="0"/>
           </a:p>
         </p:txBody>
       </p:sp>
@@ -11753,8 +11695,8 @@
         </p:blipFill>
         <p:spPr>
           <a:xfrm>
-            <a:off x="1084096" y="1058863"/>
-            <a:ext cx="6975809" cy="5268912"/>
+            <a:off x="1066800" y="2207419"/>
+            <a:ext cx="7010400" cy="2971800"/>
           </a:xfrm>
           <a:prstGeom prst="rect">
             <a:avLst/>
@@ -11784,10 +11726,49 @@
           </a:p>
         </p:txBody>
       </p:sp>
+      <p:sp>
+        <p:nvSpPr>
+          <p:cNvPr id="3" name="직사각형 2">
+            <a:extLst>
+              <a:ext uri="{FF2B5EF4-FFF2-40B4-BE49-F238E27FC236}">
+                <a16:creationId xmlns:a16="http://schemas.microsoft.com/office/drawing/2014/main" id="{C00E3815-6733-475E-8776-05475D5EF1AB}"/>
+              </a:ext>
+            </a:extLst>
+          </p:cNvPr>
+          <p:cNvSpPr/>
+          <p:nvPr/>
+        </p:nvSpPr>
+        <p:spPr>
+          <a:xfrm>
+            <a:off x="942975" y="1284089"/>
+            <a:ext cx="4572000" cy="369332"/>
+          </a:xfrm>
+          <a:prstGeom prst="rect">
+            <a:avLst/>
+          </a:prstGeom>
+        </p:spPr>
+        <p:txBody>
+          <a:bodyPr>
+            <a:spAutoFit/>
+          </a:bodyPr>
+          <a:lstStyle/>
+          <a:p>
+            <a:r>
+              <a:rPr lang="en-US" altLang="ko-KR" dirty="0"/>
+              <a:t>* GitHub </a:t>
+            </a:r>
+            <a:r>
+              <a:rPr lang="ko-KR" altLang="en-US" dirty="0"/>
+              <a:t>로그인 창이 뜰 수 있음</a:t>
+            </a:r>
+            <a:endParaRPr lang="en-US" altLang="ko-KR" dirty="0"/>
+          </a:p>
+        </p:txBody>
+      </p:sp>
     </p:spTree>
     <p:extLst>
       <p:ext uri="{BB962C8B-B14F-4D97-AF65-F5344CB8AC3E}">
-        <p14:creationId xmlns:p14="http://schemas.microsoft.com/office/powerpoint/2010/main" val="1011965140"/>
+        <p14:creationId xmlns:p14="http://schemas.microsoft.com/office/powerpoint/2010/main" val="2319590750"/>
       </p:ext>
     </p:extLst>
   </p:cSld>
@@ -11826,61 +11807,28 @@
         </p:nvSpPr>
         <p:spPr/>
         <p:txBody>
-          <a:bodyPr>
-            <a:normAutofit/>
-          </a:bodyPr>
-          <a:lstStyle/>
-          <a:p>
-            <a:r>
-              <a:rPr lang="en-US" altLang="ko-KR" dirty="0"/>
-              <a:t>Local repository </a:t>
-            </a:r>
-            <a:r>
-              <a:rPr lang="ko-KR" altLang="en-US" dirty="0"/>
-              <a:t>를 </a:t>
-            </a:r>
-            <a:r>
-              <a:rPr lang="en-US" altLang="ko-KR" dirty="0"/>
-              <a:t>GitHub remote</a:t>
-            </a:r>
-            <a:r>
-              <a:rPr lang="ko-KR" altLang="en-US" dirty="0"/>
-              <a:t>로 </a:t>
-            </a:r>
-            <a:r>
-              <a:rPr lang="en-US" altLang="ko-KR" dirty="0"/>
-              <a:t>push</a:t>
-            </a:r>
-            <a:endParaRPr lang="ko-KR" altLang="en-US" dirty="0"/>
-          </a:p>
-        </p:txBody>
-      </p:sp>
-      <p:pic>
-        <p:nvPicPr>
-          <p:cNvPr id="5" name="내용 개체 틀 4"/>
-          <p:cNvPicPr>
-            <a:picLocks noGrp="1" noChangeAspect="1"/>
-          </p:cNvPicPr>
-          <p:nvPr>
-            <p:ph idx="1"/>
-          </p:nvPr>
-        </p:nvPicPr>
-        <p:blipFill>
-          <a:blip r:embed="rId2"/>
-          <a:stretch>
-            <a:fillRect/>
-          </a:stretch>
-        </p:blipFill>
-        <p:spPr>
-          <a:xfrm>
-            <a:off x="1066800" y="2207419"/>
-            <a:ext cx="7010400" cy="2971800"/>
-          </a:xfrm>
-          <a:prstGeom prst="rect">
-            <a:avLst/>
-          </a:prstGeom>
-        </p:spPr>
-      </p:pic>
+          <a:bodyPr/>
+          <a:lstStyle/>
+          <a:p>
+            <a:r>
+              <a:rPr lang="en-US" altLang="ko-KR" dirty="0"/>
+              <a:t>Push </a:t>
+            </a:r>
+            <a:r>
+              <a:rPr lang="ko-KR" altLang="en-US" dirty="0"/>
+              <a:t>완료 후 </a:t>
+            </a:r>
+            <a:r>
+              <a:rPr lang="en-US" altLang="ko-KR" dirty="0"/>
+              <a:t>GitHub </a:t>
+            </a:r>
+            <a:r>
+              <a:rPr lang="ko-KR" altLang="en-US" dirty="0"/>
+              <a:t>확인</a:t>
+            </a:r>
+          </a:p>
+        </p:txBody>
+      </p:sp>
       <p:sp>
         <p:nvSpPr>
           <p:cNvPr id="4" name="슬라이드 번호 개체 틀 3"/>
@@ -11899,93 +11847,6 @@
             <a:fld id="{64F0D409-D3F6-4EEC-8C77-1F5E89989FFB}" type="slidenum">
               <a:rPr lang="ko-KR" altLang="en-US" smtClean="0"/>
               <a:t>46</a:t>
-            </a:fld>
-            <a:endParaRPr lang="ko-KR" altLang="en-US"/>
-          </a:p>
-        </p:txBody>
-      </p:sp>
-    </p:spTree>
-    <p:extLst>
-      <p:ext uri="{BB962C8B-B14F-4D97-AF65-F5344CB8AC3E}">
-        <p14:creationId xmlns:p14="http://schemas.microsoft.com/office/powerpoint/2010/main" val="2319590750"/>
-      </p:ext>
-    </p:extLst>
-  </p:cSld>
-  <p:clrMapOvr>
-    <a:masterClrMapping/>
-  </p:clrMapOvr>
-</p:sld>
-</file>
-
-<file path=ppt/slides/slide47.xml><?xml version="1.0" encoding="utf-8"?>
-<p:sld xmlns:a="http://schemas.openxmlformats.org/drawingml/2006/main" xmlns:r="http://schemas.openxmlformats.org/officeDocument/2006/relationships" xmlns:p="http://schemas.openxmlformats.org/presentationml/2006/main">
-  <p:cSld>
-    <p:spTree>
-      <p:nvGrpSpPr>
-        <p:cNvPr id="1" name=""/>
-        <p:cNvGrpSpPr/>
-        <p:nvPr/>
-      </p:nvGrpSpPr>
-      <p:grpSpPr>
-        <a:xfrm>
-          <a:off x="0" y="0"/>
-          <a:ext cx="0" cy="0"/>
-          <a:chOff x="0" y="0"/>
-          <a:chExt cx="0" cy="0"/>
-        </a:xfrm>
-      </p:grpSpPr>
-      <p:sp>
-        <p:nvSpPr>
-          <p:cNvPr id="2" name="제목 1"/>
-          <p:cNvSpPr>
-            <a:spLocks noGrp="1"/>
-          </p:cNvSpPr>
-          <p:nvPr>
-            <p:ph type="title"/>
-          </p:nvPr>
-        </p:nvSpPr>
-        <p:spPr/>
-        <p:txBody>
-          <a:bodyPr/>
-          <a:lstStyle/>
-          <a:p>
-            <a:r>
-              <a:rPr lang="en-US" altLang="ko-KR" dirty="0"/>
-              <a:t>Push </a:t>
-            </a:r>
-            <a:r>
-              <a:rPr lang="ko-KR" altLang="en-US" dirty="0"/>
-              <a:t>완료 후 </a:t>
-            </a:r>
-            <a:r>
-              <a:rPr lang="en-US" altLang="ko-KR" dirty="0"/>
-              <a:t>GitHub </a:t>
-            </a:r>
-            <a:r>
-              <a:rPr lang="ko-KR" altLang="en-US" dirty="0"/>
-              <a:t>확인</a:t>
-            </a:r>
-          </a:p>
-        </p:txBody>
-      </p:sp>
-      <p:sp>
-        <p:nvSpPr>
-          <p:cNvPr id="4" name="슬라이드 번호 개체 틀 3"/>
-          <p:cNvSpPr>
-            <a:spLocks noGrp="1"/>
-          </p:cNvSpPr>
-          <p:nvPr>
-            <p:ph type="sldNum" sz="quarter" idx="12"/>
-          </p:nvPr>
-        </p:nvSpPr>
-        <p:spPr/>
-        <p:txBody>
-          <a:bodyPr/>
-          <a:lstStyle/>
-          <a:p>
-            <a:fld id="{64F0D409-D3F6-4EEC-8C77-1F5E89989FFB}" type="slidenum">
-              <a:rPr lang="ko-KR" altLang="en-US" smtClean="0"/>
-              <a:t>47</a:t>
             </a:fld>
             <a:endParaRPr lang="ko-KR" altLang="en-US"/>
           </a:p>
@@ -12036,7 +11897,7 @@
 </p:sld>
 </file>
 
-<file path=ppt/slides/slide48.xml><?xml version="1.0" encoding="utf-8"?>
+<file path=ppt/slides/slide47.xml><?xml version="1.0" encoding="utf-8"?>
 <p:sld xmlns:a="http://schemas.openxmlformats.org/drawingml/2006/main" xmlns:r="http://schemas.openxmlformats.org/officeDocument/2006/relationships" xmlns:p="http://schemas.openxmlformats.org/presentationml/2006/main">
   <p:cSld>
     <p:spTree>
@@ -12096,7 +11957,7 @@
           <a:p>
             <a:fld id="{64F0D409-D3F6-4EEC-8C77-1F5E89989FFB}" type="slidenum">
               <a:rPr lang="ko-KR" altLang="en-US" smtClean="0"/>
-              <a:t>48</a:t>
+              <a:t>47</a:t>
             </a:fld>
             <a:endParaRPr lang="ko-KR" altLang="en-US"/>
           </a:p>
@@ -12147,6 +12008,120 @@
 </p:sld>
 </file>
 
+<file path=ppt/slides/slide48.xml><?xml version="1.0" encoding="utf-8"?>
+<p:sld xmlns:a="http://schemas.openxmlformats.org/drawingml/2006/main" xmlns:r="http://schemas.openxmlformats.org/officeDocument/2006/relationships" xmlns:p="http://schemas.openxmlformats.org/presentationml/2006/main">
+  <p:cSld>
+    <p:spTree>
+      <p:nvGrpSpPr>
+        <p:cNvPr id="1" name=""/>
+        <p:cNvGrpSpPr/>
+        <p:nvPr/>
+      </p:nvGrpSpPr>
+      <p:grpSpPr>
+        <a:xfrm>
+          <a:off x="0" y="0"/>
+          <a:ext cx="0" cy="0"/>
+          <a:chOff x="0" y="0"/>
+          <a:chExt cx="0" cy="0"/>
+        </a:xfrm>
+      </p:grpSpPr>
+      <p:sp>
+        <p:nvSpPr>
+          <p:cNvPr id="2" name="제목 1"/>
+          <p:cNvSpPr>
+            <a:spLocks noGrp="1"/>
+          </p:cNvSpPr>
+          <p:nvPr>
+            <p:ph type="title"/>
+          </p:nvPr>
+        </p:nvSpPr>
+        <p:spPr/>
+        <p:txBody>
+          <a:bodyPr/>
+          <a:lstStyle/>
+          <a:p>
+            <a:r>
+              <a:rPr lang="ko-KR" altLang="en-US" dirty="0"/>
+              <a:t>다른 </a:t>
+            </a:r>
+            <a:r>
+              <a:rPr lang="en-US" altLang="ko-KR" dirty="0"/>
+              <a:t>Local repository </a:t>
+            </a:r>
+            <a:r>
+              <a:rPr lang="ko-KR" altLang="en-US" dirty="0"/>
+              <a:t>생성 및 </a:t>
+            </a:r>
+            <a:r>
+              <a:rPr lang="en-US" altLang="ko-KR" dirty="0"/>
+              <a:t>GitHub clone</a:t>
+            </a:r>
+            <a:endParaRPr lang="ko-KR" altLang="en-US" dirty="0"/>
+          </a:p>
+        </p:txBody>
+      </p:sp>
+      <p:pic>
+        <p:nvPicPr>
+          <p:cNvPr id="5" name="내용 개체 틀 4"/>
+          <p:cNvPicPr>
+            <a:picLocks noGrp="1" noChangeAspect="1"/>
+          </p:cNvPicPr>
+          <p:nvPr>
+            <p:ph idx="1"/>
+          </p:nvPr>
+        </p:nvPicPr>
+        <p:blipFill>
+          <a:blip r:embed="rId2"/>
+          <a:stretch>
+            <a:fillRect/>
+          </a:stretch>
+        </p:blipFill>
+        <p:spPr>
+          <a:xfrm>
+            <a:off x="395288" y="1860042"/>
+            <a:ext cx="8353425" cy="3666554"/>
+          </a:xfrm>
+          <a:prstGeom prst="rect">
+            <a:avLst/>
+          </a:prstGeom>
+        </p:spPr>
+      </p:pic>
+      <p:sp>
+        <p:nvSpPr>
+          <p:cNvPr id="4" name="슬라이드 번호 개체 틀 3"/>
+          <p:cNvSpPr>
+            <a:spLocks noGrp="1"/>
+          </p:cNvSpPr>
+          <p:nvPr>
+            <p:ph type="sldNum" sz="quarter" idx="12"/>
+          </p:nvPr>
+        </p:nvSpPr>
+        <p:spPr/>
+        <p:txBody>
+          <a:bodyPr/>
+          <a:lstStyle/>
+          <a:p>
+            <a:fld id="{64F0D409-D3F6-4EEC-8C77-1F5E89989FFB}" type="slidenum">
+              <a:rPr lang="ko-KR" altLang="en-US" smtClean="0"/>
+              <a:t>48</a:t>
+            </a:fld>
+            <a:endParaRPr lang="ko-KR" altLang="en-US"/>
+          </a:p>
+        </p:txBody>
+      </p:sp>
+    </p:spTree>
+    <p:extLst>
+      <p:ext uri="{BB962C8B-B14F-4D97-AF65-F5344CB8AC3E}">
+        <p14:creationId xmlns:p14="http://schemas.microsoft.com/office/powerpoint/2010/main" val="970567922"/>
+      </p:ext>
+    </p:extLst>
+  </p:cSld>
+  <p:clrMapOvr>
+    <a:masterClrMapping/>
+  </p:clrMapOvr>
+</p:sld>
+</file>
+
 <file path=ppt/slides/slide49.xml><?xml version="1.0" encoding="utf-8"?>
 <p:sld xmlns:a="http://schemas.openxmlformats.org/drawingml/2006/main" xmlns:r="http://schemas.openxmlformats.org/officeDocument/2006/relationships" xmlns:p="http://schemas.openxmlformats.org/presentationml/2006/main">
   <p:cSld>
@@ -12199,15 +12174,118 @@
           </a:p>
         </p:txBody>
       </p:sp>
+      <p:sp>
+        <p:nvSpPr>
+          <p:cNvPr id="3" name="내용 개체 틀 2"/>
+          <p:cNvSpPr>
+            <a:spLocks noGrp="1"/>
+          </p:cNvSpPr>
+          <p:nvPr>
+            <p:ph idx="1"/>
+          </p:nvPr>
+        </p:nvSpPr>
+        <p:spPr/>
+        <p:txBody>
+          <a:bodyPr/>
+          <a:lstStyle/>
+          <a:p>
+            <a:r>
+              <a:rPr lang="en-US" altLang="ko-KR" sz="2000" dirty="0" err="1"/>
+              <a:t>git</a:t>
+            </a:r>
+            <a:r>
+              <a:rPr lang="en-US" altLang="ko-KR" sz="2000" dirty="0"/>
+              <a:t> clone https://github.com/hyunchan-park/</a:t>
+            </a:r>
+            <a:r>
+              <a:rPr lang="en-US" altLang="ko-KR" sz="1800" dirty="0"/>
+              <a:t>swproject</a:t>
+            </a:r>
+            <a:r>
+              <a:rPr lang="en-US" altLang="ko-KR" sz="2000" dirty="0"/>
+              <a:t>.git &lt;folder&gt;</a:t>
+            </a:r>
+          </a:p>
+          <a:p>
+            <a:endParaRPr lang="en-US" altLang="ko-KR" sz="2000" dirty="0"/>
+          </a:p>
+          <a:p>
+            <a:endParaRPr lang="en-US" altLang="ko-KR" sz="2000" dirty="0"/>
+          </a:p>
+          <a:p>
+            <a:endParaRPr lang="en-US" altLang="ko-KR" sz="2000" dirty="0"/>
+          </a:p>
+          <a:p>
+            <a:endParaRPr lang="en-US" altLang="ko-KR" sz="2000" dirty="0"/>
+          </a:p>
+          <a:p>
+            <a:endParaRPr lang="en-US" altLang="ko-KR" sz="2000" dirty="0"/>
+          </a:p>
+          <a:p>
+            <a:endParaRPr lang="en-US" altLang="ko-KR" sz="2000" dirty="0"/>
+          </a:p>
+          <a:p>
+            <a:endParaRPr lang="en-US" altLang="ko-KR" sz="2000" dirty="0"/>
+          </a:p>
+          <a:p>
+            <a:r>
+              <a:rPr lang="fr-FR" altLang="ko-KR" sz="2000" dirty="0"/>
+              <a:t>git config --global http.sslVerify false</a:t>
+            </a:r>
+          </a:p>
+          <a:p>
+            <a:r>
+              <a:rPr lang="en-US" altLang="ko-KR" sz="2000" dirty="0" err="1"/>
+              <a:t>git</a:t>
+            </a:r>
+            <a:r>
+              <a:rPr lang="en-US" altLang="ko-KR" sz="2000" dirty="0"/>
+              <a:t> remote set-</a:t>
+            </a:r>
+            <a:r>
+              <a:rPr lang="en-US" altLang="ko-KR" sz="2000" dirty="0" err="1"/>
+              <a:t>url</a:t>
+            </a:r>
+            <a:r>
+              <a:rPr lang="en-US" altLang="ko-KR" sz="2000" dirty="0"/>
+              <a:t> origin https://github.com/hyunchan-park/swproject.git</a:t>
+            </a:r>
+          </a:p>
+          <a:p>
+            <a:endParaRPr lang="ko-KR" altLang="en-US" sz="2000" dirty="0"/>
+          </a:p>
+        </p:txBody>
+      </p:sp>
+      <p:sp>
+        <p:nvSpPr>
+          <p:cNvPr id="4" name="슬라이드 번호 개체 틀 3"/>
+          <p:cNvSpPr>
+            <a:spLocks noGrp="1"/>
+          </p:cNvSpPr>
+          <p:nvPr>
+            <p:ph type="sldNum" sz="quarter" idx="12"/>
+          </p:nvPr>
+        </p:nvSpPr>
+        <p:spPr/>
+        <p:txBody>
+          <a:bodyPr/>
+          <a:lstStyle/>
+          <a:p>
+            <a:fld id="{64F0D409-D3F6-4EEC-8C77-1F5E89989FFB}" type="slidenum">
+              <a:rPr lang="ko-KR" altLang="en-US" smtClean="0"/>
+              <a:t>49</a:t>
+            </a:fld>
+            <a:endParaRPr lang="ko-KR" altLang="en-US"/>
+          </a:p>
+        </p:txBody>
+      </p:sp>
       <p:pic>
         <p:nvPicPr>
-          <p:cNvPr id="5" name="내용 개체 틀 4"/>
+          <p:cNvPr id="6" name="그림 5"/>
           <p:cNvPicPr>
-            <a:picLocks noGrp="1" noChangeAspect="1"/>
+            <a:picLocks noChangeAspect="1"/>
           </p:cNvPicPr>
-          <p:nvPr>
-            <p:ph idx="1"/>
-          </p:nvPr>
+          <p:nvPr/>
         </p:nvPicPr>
         <p:blipFill>
           <a:blip r:embed="rId2"/>
@@ -12217,8 +12295,8 @@
         </p:blipFill>
         <p:spPr>
           <a:xfrm>
-            <a:off x="395288" y="1860042"/>
-            <a:ext cx="8353425" cy="3666554"/>
+            <a:off x="1599100" y="1794729"/>
+            <a:ext cx="6086475" cy="2371725"/>
           </a:xfrm>
           <a:prstGeom prst="rect">
             <a:avLst/>
@@ -12227,31 +12305,47 @@
       </p:pic>
       <p:sp>
         <p:nvSpPr>
-          <p:cNvPr id="4" name="슬라이드 번호 개체 틀 3"/>
-          <p:cNvSpPr>
-            <a:spLocks noGrp="1"/>
-          </p:cNvSpPr>
-          <p:nvPr>
-            <p:ph type="sldNum" sz="quarter" idx="12"/>
-          </p:nvPr>
-        </p:nvSpPr>
-        <p:spPr/>
-        <p:txBody>
-          <a:bodyPr/>
-          <a:lstStyle/>
-          <a:p>
-            <a:fld id="{64F0D409-D3F6-4EEC-8C77-1F5E89989FFB}" type="slidenum">
-              <a:rPr lang="ko-KR" altLang="en-US" smtClean="0"/>
-              <a:t>49</a:t>
-            </a:fld>
-            <a:endParaRPr lang="ko-KR" altLang="en-US"/>
+          <p:cNvPr id="7" name="직사각형 6">
+            <a:extLst>
+              <a:ext uri="{FF2B5EF4-FFF2-40B4-BE49-F238E27FC236}">
+                <a16:creationId xmlns:a16="http://schemas.microsoft.com/office/drawing/2014/main" id="{999F5749-A050-440A-9681-51C81047092C}"/>
+              </a:ext>
+            </a:extLst>
+          </p:cNvPr>
+          <p:cNvSpPr/>
+          <p:nvPr/>
+        </p:nvSpPr>
+        <p:spPr>
+          <a:xfrm>
+            <a:off x="4781550" y="4170193"/>
+            <a:ext cx="4572000" cy="369332"/>
+          </a:xfrm>
+          <a:prstGeom prst="rect">
+            <a:avLst/>
+          </a:prstGeom>
+        </p:spPr>
+        <p:txBody>
+          <a:bodyPr>
+            <a:spAutoFit/>
+          </a:bodyPr>
+          <a:lstStyle/>
+          <a:p>
+            <a:r>
+              <a:rPr lang="en-US" altLang="ko-KR" dirty="0"/>
+              <a:t>* GitHub </a:t>
+            </a:r>
+            <a:r>
+              <a:rPr lang="ko-KR" altLang="en-US" dirty="0"/>
+              <a:t>로그인 창이 뜰 수 있음</a:t>
+            </a:r>
+            <a:endParaRPr lang="en-US" altLang="ko-KR" dirty="0"/>
           </a:p>
         </p:txBody>
       </p:sp>
     </p:spTree>
     <p:extLst>
       <p:ext uri="{BB962C8B-B14F-4D97-AF65-F5344CB8AC3E}">
-        <p14:creationId xmlns:p14="http://schemas.microsoft.com/office/powerpoint/2010/main" val="970567922"/>
+        <p14:creationId xmlns:p14="http://schemas.microsoft.com/office/powerpoint/2010/main" val="967878971"/>
       </p:ext>
     </p:extLst>
   </p:cSld>
@@ -12412,104 +12506,133 @@
           <a:lstStyle/>
           <a:p>
             <a:r>
-              <a:rPr lang="ko-KR" altLang="en-US" dirty="0"/>
-              <a:t>다른 </a:t>
-            </a:r>
-            <a:r>
-              <a:rPr lang="en-US" altLang="ko-KR" dirty="0"/>
-              <a:t>Local repository </a:t>
-            </a:r>
-            <a:r>
-              <a:rPr lang="ko-KR" altLang="en-US" dirty="0"/>
-              <a:t>생성 및 </a:t>
-            </a:r>
-            <a:r>
-              <a:rPr lang="en-US" altLang="ko-KR" dirty="0"/>
-              <a:t>GitHub clone</a:t>
+              <a:rPr lang="en-US" altLang="ko-KR" dirty="0"/>
+              <a:t>GitHub </a:t>
+            </a:r>
+            <a:r>
+              <a:rPr lang="ko-KR" altLang="en-US" dirty="0"/>
+              <a:t>충돌 관리</a:t>
+            </a:r>
+          </a:p>
+        </p:txBody>
+      </p:sp>
+      <p:sp>
+        <p:nvSpPr>
+          <p:cNvPr id="3" name="내용 개체 틀 2"/>
+          <p:cNvSpPr>
+            <a:spLocks noGrp="1"/>
+          </p:cNvSpPr>
+          <p:nvPr>
+            <p:ph idx="1"/>
+          </p:nvPr>
+        </p:nvSpPr>
+        <p:spPr/>
+        <p:txBody>
+          <a:bodyPr/>
+          <a:lstStyle/>
+          <a:p>
+            <a:r>
+              <a:rPr lang="ko-KR" altLang="en-US" dirty="0"/>
+              <a:t>새로운 </a:t>
+            </a:r>
+            <a:r>
+              <a:rPr lang="en-US" altLang="ko-KR" dirty="0"/>
+              <a:t>local repo TEST </a:t>
+            </a:r>
+            <a:r>
+              <a:rPr lang="ko-KR" altLang="en-US" dirty="0"/>
+              <a:t>에서 파일 수정 후 </a:t>
+            </a:r>
+            <a:r>
+              <a:rPr lang="en-US" altLang="ko-KR" dirty="0"/>
+              <a:t>commit, push </a:t>
+            </a:r>
+            <a:r>
+              <a:rPr lang="ko-KR" altLang="en-US" dirty="0"/>
+              <a:t>수행</a:t>
+            </a:r>
+            <a:endParaRPr lang="en-US" altLang="ko-KR" dirty="0"/>
+          </a:p>
+          <a:p>
+            <a:pPr lvl="1"/>
+            <a:r>
+              <a:rPr lang="en-US" altLang="ko-KR" dirty="0"/>
+              <a:t>$ </a:t>
+            </a:r>
+            <a:r>
+              <a:rPr lang="en-US" altLang="ko-KR" dirty="0" err="1"/>
+              <a:t>git</a:t>
+            </a:r>
+            <a:r>
+              <a:rPr lang="en-US" altLang="ko-KR" dirty="0"/>
+              <a:t> push origin master</a:t>
+            </a:r>
+          </a:p>
+          <a:p>
+            <a:pPr lvl="2"/>
+            <a:r>
+              <a:rPr lang="en-US" altLang="ko-KR" dirty="0"/>
+              <a:t>Local repository</a:t>
+            </a:r>
+            <a:r>
+              <a:rPr lang="ko-KR" altLang="en-US" dirty="0"/>
+              <a:t>의 </a:t>
+            </a:r>
+            <a:r>
+              <a:rPr lang="en-US" altLang="ko-KR" dirty="0"/>
+              <a:t>commit </a:t>
+            </a:r>
+            <a:r>
+              <a:rPr lang="ko-KR" altLang="en-US" dirty="0"/>
+              <a:t>내역을 </a:t>
+            </a:r>
+            <a:r>
+              <a:rPr lang="en-US" altLang="ko-KR" dirty="0"/>
+              <a:t>remote</a:t>
+            </a:r>
+            <a:r>
+              <a:rPr lang="ko-KR" altLang="en-US" dirty="0"/>
+              <a:t>로 전송</a:t>
+            </a:r>
+            <a:endParaRPr lang="en-US" altLang="ko-KR" dirty="0"/>
+          </a:p>
+          <a:p>
+            <a:endParaRPr lang="en-US" altLang="ko-KR" dirty="0"/>
+          </a:p>
+          <a:p>
+            <a:r>
+              <a:rPr lang="ko-KR" altLang="en-US" dirty="0"/>
+              <a:t>기존 </a:t>
+            </a:r>
+            <a:r>
+              <a:rPr lang="en-US" altLang="ko-KR" dirty="0"/>
+              <a:t>local repo Tutorial </a:t>
+            </a:r>
+            <a:r>
+              <a:rPr lang="ko-KR" altLang="en-US" dirty="0"/>
+              <a:t>에서 파일 수정 후 </a:t>
+            </a:r>
+            <a:r>
+              <a:rPr lang="en-US" altLang="ko-KR" dirty="0"/>
+              <a:t>commit, push </a:t>
+            </a:r>
+            <a:r>
+              <a:rPr lang="ko-KR" altLang="en-US" dirty="0"/>
+              <a:t>수행</a:t>
+            </a:r>
+            <a:endParaRPr lang="en-US" altLang="ko-KR" dirty="0"/>
+          </a:p>
+          <a:p>
+            <a:pPr lvl="1"/>
+            <a:r>
+              <a:rPr lang="ko-KR" altLang="en-US" dirty="0"/>
+              <a:t>결과는</a:t>
+            </a:r>
+            <a:r>
+              <a:rPr lang="en-US" altLang="ko-KR" dirty="0"/>
+              <a:t>? </a:t>
             </a:r>
             <a:endParaRPr lang="ko-KR" altLang="en-US" dirty="0"/>
-          </a:p>
-        </p:txBody>
-      </p:sp>
-      <p:sp>
-        <p:nvSpPr>
-          <p:cNvPr id="3" name="내용 개체 틀 2"/>
-          <p:cNvSpPr>
-            <a:spLocks noGrp="1"/>
-          </p:cNvSpPr>
-          <p:nvPr>
-            <p:ph idx="1"/>
-          </p:nvPr>
-        </p:nvSpPr>
-        <p:spPr/>
-        <p:txBody>
-          <a:bodyPr/>
-          <a:lstStyle/>
-          <a:p>
-            <a:r>
-              <a:rPr lang="en-US" altLang="ko-KR" sz="2000" dirty="0" err="1"/>
-              <a:t>git</a:t>
-            </a:r>
-            <a:r>
-              <a:rPr lang="en-US" altLang="ko-KR" sz="2000" dirty="0"/>
-              <a:t> clone https://github.com/hyunchan-park/</a:t>
-            </a:r>
-            <a:r>
-              <a:rPr lang="en-US" altLang="ko-KR" sz="1800" dirty="0"/>
-              <a:t>swproject</a:t>
-            </a:r>
-            <a:r>
-              <a:rPr lang="en-US" altLang="ko-KR" sz="2000" dirty="0"/>
-              <a:t>.git &lt;folder&gt;</a:t>
-            </a:r>
-          </a:p>
-          <a:p>
-            <a:endParaRPr lang="en-US" altLang="ko-KR" sz="2000" dirty="0"/>
-          </a:p>
-          <a:p>
-            <a:endParaRPr lang="en-US" altLang="ko-KR" sz="2000" dirty="0"/>
-          </a:p>
-          <a:p>
-            <a:endParaRPr lang="en-US" altLang="ko-KR" sz="2000" dirty="0"/>
-          </a:p>
-          <a:p>
-            <a:endParaRPr lang="en-US" altLang="ko-KR" sz="2000" dirty="0"/>
-          </a:p>
-          <a:p>
-            <a:endParaRPr lang="en-US" altLang="ko-KR" sz="2000" dirty="0"/>
-          </a:p>
-          <a:p>
-            <a:endParaRPr lang="en-US" altLang="ko-KR" sz="2000" dirty="0"/>
-          </a:p>
-          <a:p>
-            <a:endParaRPr lang="en-US" altLang="ko-KR" sz="2000" dirty="0"/>
-          </a:p>
-          <a:p>
-            <a:r>
-              <a:rPr lang="fr-FR" altLang="ko-KR" sz="2000" dirty="0"/>
-              <a:t>git config --global http.sslVerify false</a:t>
-            </a:r>
-          </a:p>
-          <a:p>
-            <a:r>
-              <a:rPr lang="en-US" altLang="ko-KR" sz="2000" dirty="0" err="1"/>
-              <a:t>git</a:t>
-            </a:r>
-            <a:r>
-              <a:rPr lang="en-US" altLang="ko-KR" sz="2000" dirty="0"/>
-              <a:t> remote set-</a:t>
-            </a:r>
-            <a:r>
-              <a:rPr lang="en-US" altLang="ko-KR" sz="2000" dirty="0" err="1"/>
-              <a:t>url</a:t>
-            </a:r>
-            <a:r>
-              <a:rPr lang="en-US" altLang="ko-KR" sz="2000" dirty="0"/>
-              <a:t> origin https://github.com/hyunchan-park/swproject.git</a:t>
-            </a:r>
-          </a:p>
-          <a:p>
-            <a:endParaRPr lang="ko-KR" altLang="en-US" sz="2000" dirty="0"/>
           </a:p>
         </p:txBody>
       </p:sp>
@@ -12536,34 +12659,10 @@
           </a:p>
         </p:txBody>
       </p:sp>
-      <p:pic>
-        <p:nvPicPr>
-          <p:cNvPr id="6" name="그림 5"/>
-          <p:cNvPicPr>
-            <a:picLocks noChangeAspect="1"/>
-          </p:cNvPicPr>
-          <p:nvPr/>
-        </p:nvPicPr>
-        <p:blipFill>
-          <a:blip r:embed="rId2"/>
-          <a:stretch>
-            <a:fillRect/>
-          </a:stretch>
-        </p:blipFill>
-        <p:spPr>
-          <a:xfrm>
-            <a:off x="1599100" y="1794729"/>
-            <a:ext cx="6086475" cy="2371725"/>
-          </a:xfrm>
-          <a:prstGeom prst="rect">
-            <a:avLst/>
-          </a:prstGeom>
-        </p:spPr>
-      </p:pic>
     </p:spTree>
     <p:extLst>
       <p:ext uri="{BB962C8B-B14F-4D97-AF65-F5344CB8AC3E}">
-        <p14:creationId xmlns:p14="http://schemas.microsoft.com/office/powerpoint/2010/main" val="967878971"/>
+        <p14:creationId xmlns:p14="http://schemas.microsoft.com/office/powerpoint/2010/main" val="706474018"/>
       </p:ext>
     </p:extLst>
   </p:cSld>
@@ -12592,205 +12691,6 @@
       </p:grpSpPr>
       <p:sp>
         <p:nvSpPr>
-          <p:cNvPr id="2" name="제목 1"/>
-          <p:cNvSpPr>
-            <a:spLocks noGrp="1"/>
-          </p:cNvSpPr>
-          <p:nvPr>
-            <p:ph type="title"/>
-          </p:nvPr>
-        </p:nvSpPr>
-        <p:spPr/>
-        <p:txBody>
-          <a:bodyPr/>
-          <a:lstStyle/>
-          <a:p>
-            <a:r>
-              <a:rPr lang="en-US" altLang="ko-KR" dirty="0"/>
-              <a:t>GitHub </a:t>
-            </a:r>
-            <a:r>
-              <a:rPr lang="ko-KR" altLang="en-US" dirty="0"/>
-              <a:t>충돌 관리</a:t>
-            </a:r>
-          </a:p>
-        </p:txBody>
-      </p:sp>
-      <p:sp>
-        <p:nvSpPr>
-          <p:cNvPr id="3" name="내용 개체 틀 2"/>
-          <p:cNvSpPr>
-            <a:spLocks noGrp="1"/>
-          </p:cNvSpPr>
-          <p:nvPr>
-            <p:ph idx="1"/>
-          </p:nvPr>
-        </p:nvSpPr>
-        <p:spPr/>
-        <p:txBody>
-          <a:bodyPr/>
-          <a:lstStyle/>
-          <a:p>
-            <a:r>
-              <a:rPr lang="ko-KR" altLang="en-US" dirty="0"/>
-              <a:t>새로운 </a:t>
-            </a:r>
-            <a:r>
-              <a:rPr lang="en-US" altLang="ko-KR" dirty="0"/>
-              <a:t>local repo TEST </a:t>
-            </a:r>
-            <a:r>
-              <a:rPr lang="ko-KR" altLang="en-US" dirty="0"/>
-              <a:t>에서 파일 수정 후 </a:t>
-            </a:r>
-            <a:r>
-              <a:rPr lang="en-US" altLang="ko-KR" dirty="0"/>
-              <a:t>commit, push </a:t>
-            </a:r>
-            <a:r>
-              <a:rPr lang="ko-KR" altLang="en-US" dirty="0"/>
-              <a:t>수행</a:t>
-            </a:r>
-            <a:endParaRPr lang="en-US" altLang="ko-KR" dirty="0"/>
-          </a:p>
-          <a:p>
-            <a:pPr lvl="1"/>
-            <a:r>
-              <a:rPr lang="en-US" altLang="ko-KR" dirty="0"/>
-              <a:t>$ </a:t>
-            </a:r>
-            <a:r>
-              <a:rPr lang="en-US" altLang="ko-KR" dirty="0" err="1"/>
-              <a:t>git</a:t>
-            </a:r>
-            <a:r>
-              <a:rPr lang="en-US" altLang="ko-KR" dirty="0"/>
-              <a:t> push origin master</a:t>
-            </a:r>
-          </a:p>
-          <a:p>
-            <a:pPr lvl="2"/>
-            <a:r>
-              <a:rPr lang="en-US" altLang="ko-KR" dirty="0"/>
-              <a:t>Local repository</a:t>
-            </a:r>
-            <a:r>
-              <a:rPr lang="ko-KR" altLang="en-US" dirty="0"/>
-              <a:t>의 </a:t>
-            </a:r>
-            <a:r>
-              <a:rPr lang="en-US" altLang="ko-KR" dirty="0"/>
-              <a:t>commit </a:t>
-            </a:r>
-            <a:r>
-              <a:rPr lang="ko-KR" altLang="en-US" dirty="0"/>
-              <a:t>내역을 </a:t>
-            </a:r>
-            <a:r>
-              <a:rPr lang="en-US" altLang="ko-KR" dirty="0"/>
-              <a:t>remote</a:t>
-            </a:r>
-            <a:r>
-              <a:rPr lang="ko-KR" altLang="en-US" dirty="0"/>
-              <a:t>로 전송</a:t>
-            </a:r>
-            <a:endParaRPr lang="en-US" altLang="ko-KR" dirty="0"/>
-          </a:p>
-          <a:p>
-            <a:endParaRPr lang="en-US" altLang="ko-KR" dirty="0"/>
-          </a:p>
-          <a:p>
-            <a:r>
-              <a:rPr lang="ko-KR" altLang="en-US" dirty="0"/>
-              <a:t>기존 </a:t>
-            </a:r>
-            <a:r>
-              <a:rPr lang="en-US" altLang="ko-KR" dirty="0"/>
-              <a:t>local repo Tutorial </a:t>
-            </a:r>
-            <a:r>
-              <a:rPr lang="ko-KR" altLang="en-US" dirty="0"/>
-              <a:t>에서 파일 수정 후 </a:t>
-            </a:r>
-            <a:r>
-              <a:rPr lang="en-US" altLang="ko-KR" dirty="0"/>
-              <a:t>commit, push </a:t>
-            </a:r>
-            <a:r>
-              <a:rPr lang="ko-KR" altLang="en-US" dirty="0"/>
-              <a:t>수행</a:t>
-            </a:r>
-            <a:endParaRPr lang="en-US" altLang="ko-KR" dirty="0"/>
-          </a:p>
-          <a:p>
-            <a:pPr lvl="1"/>
-            <a:r>
-              <a:rPr lang="ko-KR" altLang="en-US" dirty="0"/>
-              <a:t>결과는</a:t>
-            </a:r>
-            <a:r>
-              <a:rPr lang="en-US" altLang="ko-KR" dirty="0"/>
-              <a:t>? </a:t>
-            </a:r>
-            <a:endParaRPr lang="ko-KR" altLang="en-US" dirty="0"/>
-          </a:p>
-        </p:txBody>
-      </p:sp>
-      <p:sp>
-        <p:nvSpPr>
-          <p:cNvPr id="4" name="슬라이드 번호 개체 틀 3"/>
-          <p:cNvSpPr>
-            <a:spLocks noGrp="1"/>
-          </p:cNvSpPr>
-          <p:nvPr>
-            <p:ph type="sldNum" sz="quarter" idx="12"/>
-          </p:nvPr>
-        </p:nvSpPr>
-        <p:spPr/>
-        <p:txBody>
-          <a:bodyPr/>
-          <a:lstStyle/>
-          <a:p>
-            <a:fld id="{64F0D409-D3F6-4EEC-8C77-1F5E89989FFB}" type="slidenum">
-              <a:rPr lang="ko-KR" altLang="en-US" smtClean="0"/>
-              <a:t>51</a:t>
-            </a:fld>
-            <a:endParaRPr lang="ko-KR" altLang="en-US"/>
-          </a:p>
-        </p:txBody>
-      </p:sp>
-    </p:spTree>
-    <p:extLst>
-      <p:ext uri="{BB962C8B-B14F-4D97-AF65-F5344CB8AC3E}">
-        <p14:creationId xmlns:p14="http://schemas.microsoft.com/office/powerpoint/2010/main" val="706474018"/>
-      </p:ext>
-    </p:extLst>
-  </p:cSld>
-  <p:clrMapOvr>
-    <a:masterClrMapping/>
-  </p:clrMapOvr>
-</p:sld>
-</file>
-
-<file path=ppt/slides/slide52.xml><?xml version="1.0" encoding="utf-8"?>
-<p:sld xmlns:a="http://schemas.openxmlformats.org/drawingml/2006/main" xmlns:r="http://schemas.openxmlformats.org/officeDocument/2006/relationships" xmlns:p="http://schemas.openxmlformats.org/presentationml/2006/main">
-  <p:cSld>
-    <p:spTree>
-      <p:nvGrpSpPr>
-        <p:cNvPr id="1" name=""/>
-        <p:cNvGrpSpPr/>
-        <p:nvPr/>
-      </p:nvGrpSpPr>
-      <p:grpSpPr>
-        <a:xfrm>
-          <a:off x="0" y="0"/>
-          <a:ext cx="0" cy="0"/>
-          <a:chOff x="0" y="0"/>
-          <a:chExt cx="0" cy="0"/>
-        </a:xfrm>
-      </p:grpSpPr>
-      <p:sp>
-        <p:nvSpPr>
           <p:cNvPr id="5" name="제목 4"/>
           <p:cNvSpPr>
             <a:spLocks noGrp="1"/>
@@ -12883,7 +12783,7 @@
           <a:p>
             <a:fld id="{64F0D409-D3F6-4EEC-8C77-1F5E89989FFB}" type="slidenum">
               <a:rPr lang="ko-KR" altLang="en-US" smtClean="0"/>
-              <a:t>52</a:t>
+              <a:t>51</a:t>
             </a:fld>
             <a:endParaRPr lang="ko-KR" altLang="en-US"/>
           </a:p>
@@ -13042,7 +12942,7 @@
 </p:sld>
 </file>
 
-<file path=ppt/slides/slide53.xml><?xml version="1.0" encoding="utf-8"?>
+<file path=ppt/slides/slide52.xml><?xml version="1.0" encoding="utf-8"?>
 <p:sld xmlns:a="http://schemas.openxmlformats.org/drawingml/2006/main" xmlns:r="http://schemas.openxmlformats.org/officeDocument/2006/relationships" xmlns:p="http://schemas.openxmlformats.org/presentationml/2006/main">
   <p:cSld>
     <p:spTree>
@@ -13102,7 +13002,7 @@
           <a:p>
             <a:fld id="{64F0D409-D3F6-4EEC-8C77-1F5E89989FFB}" type="slidenum">
               <a:rPr lang="ko-KR" altLang="en-US" smtClean="0"/>
-              <a:t>53</a:t>
+              <a:t>52</a:t>
             </a:fld>
             <a:endParaRPr lang="ko-KR" altLang="en-US"/>
           </a:p>
@@ -13169,7 +13069,7 @@
 </p:sld>
 </file>
 
-<file path=ppt/slides/slide54.xml><?xml version="1.0" encoding="utf-8"?>
+<file path=ppt/slides/slide53.xml><?xml version="1.0" encoding="utf-8"?>
 <p:sld xmlns:a="http://schemas.openxmlformats.org/drawingml/2006/main" xmlns:r="http://schemas.openxmlformats.org/officeDocument/2006/relationships" xmlns:p="http://schemas.openxmlformats.org/presentationml/2006/main">
   <p:cSld>
     <p:spTree>
@@ -13263,7 +13163,7 @@
           <a:p>
             <a:fld id="{64F0D409-D3F6-4EEC-8C77-1F5E89989FFB}" type="slidenum">
               <a:rPr lang="ko-KR" altLang="en-US" smtClean="0"/>
-              <a:t>54</a:t>
+              <a:t>53</a:t>
             </a:fld>
             <a:endParaRPr lang="ko-KR" altLang="en-US"/>
           </a:p>
@@ -13306,7 +13206,7 @@
 </p:sld>
 </file>
 
-<file path=ppt/slides/slide55.xml><?xml version="1.0" encoding="utf-8"?>
+<file path=ppt/slides/slide54.xml><?xml version="1.0" encoding="utf-8"?>
 <p:sld xmlns:a="http://schemas.openxmlformats.org/drawingml/2006/main" xmlns:r="http://schemas.openxmlformats.org/officeDocument/2006/relationships" xmlns:p="http://schemas.openxmlformats.org/presentationml/2006/main">
   <p:cSld>
     <p:spTree>
@@ -13446,7 +13346,7 @@
           <a:p>
             <a:fld id="{64F0D409-D3F6-4EEC-8C77-1F5E89989FFB}" type="slidenum">
               <a:rPr lang="ko-KR" altLang="en-US" smtClean="0"/>
-              <a:t>55</a:t>
+              <a:t>54</a:t>
             </a:fld>
             <a:endParaRPr lang="ko-KR" altLang="en-US"/>
           </a:p>
@@ -13468,7 +13368,7 @@
         </p:blipFill>
         <p:spPr>
           <a:xfrm>
-            <a:off x="465874" y="2745895"/>
+            <a:off x="503974" y="2934300"/>
             <a:ext cx="4572000" cy="1752600"/>
           </a:xfrm>
           <a:prstGeom prst="rect">
@@ -13492,7 +13392,7 @@
         </p:blipFill>
         <p:spPr>
           <a:xfrm>
-            <a:off x="465874" y="4498495"/>
+            <a:off x="503974" y="4686900"/>
             <a:ext cx="5219700" cy="1762125"/>
           </a:xfrm>
           <a:prstGeom prst="rect">
@@ -13504,6 +13404,131 @@
     <p:extLst>
       <p:ext uri="{BB962C8B-B14F-4D97-AF65-F5344CB8AC3E}">
         <p14:creationId xmlns:p14="http://schemas.microsoft.com/office/powerpoint/2010/main" val="924207005"/>
+      </p:ext>
+    </p:extLst>
+  </p:cSld>
+  <p:clrMapOvr>
+    <a:masterClrMapping/>
+  </p:clrMapOvr>
+</p:sld>
+</file>
+
+<file path=ppt/slides/slide55.xml><?xml version="1.0" encoding="utf-8"?>
+<p:sld xmlns:a="http://schemas.openxmlformats.org/drawingml/2006/main" xmlns:r="http://schemas.openxmlformats.org/officeDocument/2006/relationships" xmlns:p="http://schemas.openxmlformats.org/presentationml/2006/main">
+  <p:cSld>
+    <p:spTree>
+      <p:nvGrpSpPr>
+        <p:cNvPr id="1" name=""/>
+        <p:cNvGrpSpPr/>
+        <p:nvPr/>
+      </p:nvGrpSpPr>
+      <p:grpSpPr>
+        <a:xfrm>
+          <a:off x="0" y="0"/>
+          <a:ext cx="0" cy="0"/>
+          <a:chOff x="0" y="0"/>
+          <a:chExt cx="0" cy="0"/>
+        </a:xfrm>
+      </p:grpSpPr>
+      <p:sp>
+        <p:nvSpPr>
+          <p:cNvPr id="2" name="제목 1"/>
+          <p:cNvSpPr>
+            <a:spLocks noGrp="1"/>
+          </p:cNvSpPr>
+          <p:nvPr>
+            <p:ph type="title"/>
+          </p:nvPr>
+        </p:nvSpPr>
+        <p:spPr/>
+        <p:txBody>
+          <a:bodyPr/>
+          <a:lstStyle/>
+          <a:p>
+            <a:r>
+              <a:rPr lang="en-US" altLang="ko-KR" dirty="0" err="1"/>
+              <a:t>Git</a:t>
+            </a:r>
+            <a:r>
+              <a:rPr lang="en-US" altLang="ko-KR" dirty="0"/>
+              <a:t> </a:t>
+            </a:r>
+            <a:r>
+              <a:rPr lang="ko-KR" altLang="en-US" dirty="0"/>
+              <a:t>충돌 관리</a:t>
+            </a:r>
+            <a:r>
+              <a:rPr lang="en-US" altLang="ko-KR" dirty="0"/>
+              <a:t>: </a:t>
+            </a:r>
+            <a:r>
+              <a:rPr lang="ko-KR" altLang="en-US" dirty="0"/>
+              <a:t>최종 결과 </a:t>
+            </a:r>
+            <a:r>
+              <a:rPr lang="en-US" altLang="ko-KR" dirty="0"/>
+              <a:t>GitHub</a:t>
+            </a:r>
+            <a:r>
+              <a:rPr lang="ko-KR" altLang="en-US" dirty="0"/>
+              <a:t>에서 확인</a:t>
+            </a:r>
+          </a:p>
+        </p:txBody>
+      </p:sp>
+      <p:pic>
+        <p:nvPicPr>
+          <p:cNvPr id="5" name="내용 개체 틀 4"/>
+          <p:cNvPicPr>
+            <a:picLocks noGrp="1" noChangeAspect="1"/>
+          </p:cNvPicPr>
+          <p:nvPr>
+            <p:ph idx="1"/>
+          </p:nvPr>
+        </p:nvPicPr>
+        <p:blipFill>
+          <a:blip r:embed="rId2"/>
+          <a:stretch>
+            <a:fillRect/>
+          </a:stretch>
+        </p:blipFill>
+        <p:spPr>
+          <a:xfrm>
+            <a:off x="395288" y="1496394"/>
+            <a:ext cx="8353425" cy="4393850"/>
+          </a:xfrm>
+          <a:prstGeom prst="rect">
+            <a:avLst/>
+          </a:prstGeom>
+        </p:spPr>
+      </p:pic>
+      <p:sp>
+        <p:nvSpPr>
+          <p:cNvPr id="4" name="슬라이드 번호 개체 틀 3"/>
+          <p:cNvSpPr>
+            <a:spLocks noGrp="1"/>
+          </p:cNvSpPr>
+          <p:nvPr>
+            <p:ph type="sldNum" sz="quarter" idx="12"/>
+          </p:nvPr>
+        </p:nvSpPr>
+        <p:spPr/>
+        <p:txBody>
+          <a:bodyPr/>
+          <a:lstStyle/>
+          <a:p>
+            <a:fld id="{64F0D409-D3F6-4EEC-8C77-1F5E89989FFB}" type="slidenum">
+              <a:rPr lang="ko-KR" altLang="en-US" smtClean="0"/>
+              <a:t>55</a:t>
+            </a:fld>
+            <a:endParaRPr lang="ko-KR" altLang="en-US"/>
+          </a:p>
+        </p:txBody>
+      </p:sp>
+    </p:spTree>
+    <p:extLst>
+      <p:ext uri="{BB962C8B-B14F-4D97-AF65-F5344CB8AC3E}">
+        <p14:creationId xmlns:p14="http://schemas.microsoft.com/office/powerpoint/2010/main" val="2819048120"/>
       </p:ext>
     </p:extLst>
   </p:cSld>
@@ -13546,8 +13571,16 @@
           <a:lstStyle/>
           <a:p>
             <a:r>
+              <a:rPr lang="ko-KR" altLang="en-US" dirty="0"/>
+              <a:t>실습 과제 </a:t>
+            </a:r>
+            <a:r>
+              <a:rPr lang="en-US" altLang="ko-KR" dirty="0"/>
+              <a:t>(</a:t>
+            </a:r>
+            <a:r>
               <a:rPr lang="en-US" altLang="ko-KR" dirty="0" err="1"/>
-              <a:t>Git</a:t>
+              <a:t>git</a:t>
             </a:r>
             <a:r>
               <a:rPr lang="en-US" altLang="ko-KR" dirty="0"/>
@@ -13555,53 +13588,309 @@
             </a:r>
             <a:r>
               <a:rPr lang="ko-KR" altLang="en-US" dirty="0"/>
-              <a:t>충돌 관리</a:t>
-            </a:r>
-            <a:r>
-              <a:rPr lang="en-US" altLang="ko-KR" dirty="0"/>
-              <a:t>: </a:t>
-            </a:r>
-            <a:r>
-              <a:rPr lang="ko-KR" altLang="en-US" dirty="0"/>
-              <a:t>최종 결과 </a:t>
-            </a:r>
-            <a:r>
-              <a:rPr lang="en-US" altLang="ko-KR" dirty="0"/>
-              <a:t>GitHub</a:t>
-            </a:r>
-            <a:r>
-              <a:rPr lang="ko-KR" altLang="en-US" dirty="0"/>
-              <a:t>에서 확인</a:t>
-            </a:r>
-          </a:p>
-        </p:txBody>
-      </p:sp>
-      <p:pic>
-        <p:nvPicPr>
-          <p:cNvPr id="5" name="내용 개체 틀 4"/>
-          <p:cNvPicPr>
-            <a:picLocks noGrp="1" noChangeAspect="1"/>
-          </p:cNvPicPr>
+              <a:t>개인 실습 </a:t>
+            </a:r>
+            <a:r>
+              <a:rPr lang="en-US" altLang="ko-KR" dirty="0"/>
+              <a:t>#2)</a:t>
+            </a:r>
+            <a:endParaRPr lang="ko-KR" altLang="en-US" dirty="0"/>
+          </a:p>
+        </p:txBody>
+      </p:sp>
+      <p:sp>
+        <p:nvSpPr>
+          <p:cNvPr id="3" name="내용 개체 틀 2"/>
+          <p:cNvSpPr>
+            <a:spLocks noGrp="1"/>
+          </p:cNvSpPr>
           <p:nvPr>
             <p:ph idx="1"/>
           </p:nvPr>
-        </p:nvPicPr>
-        <p:blipFill>
-          <a:blip r:embed="rId2"/>
-          <a:stretch>
-            <a:fillRect/>
-          </a:stretch>
-        </p:blipFill>
+        </p:nvSpPr>
         <p:spPr>
           <a:xfrm>
-            <a:off x="395288" y="1496394"/>
-            <a:ext cx="8353425" cy="4393850"/>
+            <a:off x="395536" y="1058566"/>
+            <a:ext cx="8572618" cy="5269953"/>
           </a:xfrm>
-          <a:prstGeom prst="rect">
-            <a:avLst/>
-          </a:prstGeom>
         </p:spPr>
-      </p:pic>
+        <p:txBody>
+          <a:bodyPr/>
+          <a:lstStyle/>
+          <a:p>
+            <a:r>
+              <a:rPr lang="en-US" altLang="ko-KR" dirty="0"/>
+              <a:t>GitHub Desktop </a:t>
+            </a:r>
+            <a:r>
+              <a:rPr lang="ko-KR" altLang="en-US" dirty="0"/>
+              <a:t>설치하고</a:t>
+            </a:r>
+            <a:r>
+              <a:rPr lang="en-US" altLang="ko-KR" dirty="0"/>
+              <a:t>, </a:t>
+            </a:r>
+            <a:r>
+              <a:rPr lang="ko-KR" altLang="en-US" dirty="0"/>
+              <a:t>두 개의 </a:t>
+            </a:r>
+            <a:r>
+              <a:rPr lang="en-US" altLang="ko-KR" dirty="0"/>
+              <a:t>local repo </a:t>
+            </a:r>
+            <a:r>
+              <a:rPr lang="ko-KR" altLang="en-US" dirty="0"/>
+              <a:t>를 이용</a:t>
+            </a:r>
+            <a:r>
+              <a:rPr lang="en-US" altLang="ko-KR" dirty="0"/>
+              <a:t>, </a:t>
+            </a:r>
+            <a:r>
+              <a:rPr lang="ko-KR" altLang="en-US" dirty="0"/>
+              <a:t>충돌 시연</a:t>
+            </a:r>
+            <a:endParaRPr lang="en-US" altLang="ko-KR" dirty="0"/>
+          </a:p>
+          <a:p>
+            <a:pPr lvl="1"/>
+            <a:r>
+              <a:rPr lang="en-US" altLang="ko-KR" dirty="0"/>
+              <a:t>Slide #51 </a:t>
+            </a:r>
+            <a:r>
+              <a:rPr lang="ko-KR" altLang="en-US" dirty="0"/>
+              <a:t>의 화면처럼 각각의 </a:t>
+            </a:r>
+            <a:r>
+              <a:rPr lang="en-US" altLang="ko-KR" dirty="0"/>
+              <a:t>repo </a:t>
+            </a:r>
+            <a:r>
+              <a:rPr lang="ko-KR" altLang="en-US" dirty="0"/>
+              <a:t>에서 </a:t>
+            </a:r>
+            <a:r>
+              <a:rPr lang="en-US" altLang="ko-KR" dirty="0"/>
+              <a:t>git log </a:t>
+            </a:r>
+            <a:r>
+              <a:rPr lang="ko-KR" altLang="en-US" dirty="0"/>
+              <a:t>수행 후</a:t>
+            </a:r>
+            <a:r>
+              <a:rPr lang="en-US" altLang="ko-KR" dirty="0"/>
+              <a:t>,</a:t>
+            </a:r>
+            <a:r>
+              <a:rPr lang="ko-KR" altLang="en-US" dirty="0"/>
+              <a:t> 캡처</a:t>
+            </a:r>
+            <a:endParaRPr lang="en-US" altLang="ko-KR" dirty="0"/>
+          </a:p>
+          <a:p>
+            <a:pPr lvl="2"/>
+            <a:r>
+              <a:rPr lang="en-US" altLang="ko-KR" dirty="0" err="1"/>
+              <a:t>git</a:t>
+            </a:r>
+            <a:r>
+              <a:rPr lang="en-US" altLang="ko-KR" dirty="0"/>
+              <a:t> log </a:t>
+            </a:r>
+            <a:r>
+              <a:rPr lang="ko-KR" altLang="en-US" dirty="0"/>
+              <a:t>캡처</a:t>
+            </a:r>
+            <a:r>
+              <a:rPr lang="en-US" altLang="ko-KR" dirty="0"/>
+              <a:t>: log.jpg</a:t>
+            </a:r>
+          </a:p>
+          <a:p>
+            <a:pPr lvl="1"/>
+            <a:r>
+              <a:rPr lang="en-US" altLang="ko-KR" dirty="0"/>
+              <a:t>Slide #52 </a:t>
+            </a:r>
+            <a:r>
+              <a:rPr lang="ko-KR" altLang="en-US" dirty="0"/>
+              <a:t>처럼</a:t>
+            </a:r>
+            <a:r>
+              <a:rPr lang="en-US" altLang="ko-KR" dirty="0"/>
+              <a:t>, Test </a:t>
+            </a:r>
+            <a:r>
+              <a:rPr lang="ko-KR" altLang="en-US" dirty="0"/>
+              <a:t>에서 먼저 </a:t>
+            </a:r>
+            <a:r>
+              <a:rPr lang="en-US" altLang="ko-KR" dirty="0"/>
+              <a:t>push </a:t>
+            </a:r>
+            <a:r>
+              <a:rPr lang="ko-KR" altLang="en-US" dirty="0"/>
+              <a:t>한 후</a:t>
+            </a:r>
+            <a:r>
+              <a:rPr lang="en-US" altLang="ko-KR" dirty="0"/>
+              <a:t>, tutorial </a:t>
+            </a:r>
+            <a:r>
+              <a:rPr lang="ko-KR" altLang="en-US" dirty="0"/>
+              <a:t>에서 </a:t>
+            </a:r>
+            <a:r>
+              <a:rPr lang="en-US" altLang="ko-KR" dirty="0"/>
+              <a:t>push</a:t>
+            </a:r>
+            <a:r>
+              <a:rPr lang="ko-KR" altLang="en-US" dirty="0"/>
+              <a:t> 오류 확인</a:t>
+            </a:r>
+            <a:endParaRPr lang="en-US" altLang="ko-KR" dirty="0"/>
+          </a:p>
+          <a:p>
+            <a:pPr lvl="2"/>
+            <a:r>
+              <a:rPr lang="en-US" altLang="ko-KR" dirty="0"/>
+              <a:t>crash.jpg</a:t>
+            </a:r>
+          </a:p>
+          <a:p>
+            <a:pPr lvl="1"/>
+            <a:r>
+              <a:rPr lang="en-US" altLang="ko-KR" dirty="0"/>
+              <a:t>Slide #53,54 </a:t>
+            </a:r>
+            <a:r>
+              <a:rPr lang="ko-KR" altLang="en-US" dirty="0"/>
+              <a:t>처럼</a:t>
+            </a:r>
+            <a:r>
+              <a:rPr lang="en-US" altLang="ko-KR" dirty="0"/>
+              <a:t>, tutorial </a:t>
+            </a:r>
+            <a:r>
+              <a:rPr lang="ko-KR" altLang="en-US" dirty="0"/>
+              <a:t>에서 새로운 파일 추가 후</a:t>
+            </a:r>
+            <a:r>
+              <a:rPr lang="en-US" altLang="ko-KR" dirty="0"/>
+              <a:t>, pull </a:t>
+            </a:r>
+            <a:r>
+              <a:rPr lang="ko-KR" altLang="en-US" dirty="0"/>
+              <a:t>하고</a:t>
+            </a:r>
+            <a:r>
+              <a:rPr lang="en-US" altLang="ko-KR" dirty="0"/>
+              <a:t>, </a:t>
+            </a:r>
+            <a:r>
+              <a:rPr lang="ko-KR" altLang="en-US" dirty="0"/>
+              <a:t>다시 </a:t>
+            </a:r>
+            <a:r>
+              <a:rPr lang="en-US" altLang="ko-KR" dirty="0" err="1"/>
+              <a:t>test.c</a:t>
+            </a:r>
+            <a:r>
+              <a:rPr lang="en-US" altLang="ko-KR" dirty="0"/>
+              <a:t> </a:t>
+            </a:r>
+            <a:r>
+              <a:rPr lang="ko-KR" altLang="en-US" dirty="0"/>
+              <a:t>내용 확인 한 후</a:t>
+            </a:r>
+            <a:r>
+              <a:rPr lang="en-US" altLang="ko-KR" dirty="0"/>
+              <a:t>, push </a:t>
+            </a:r>
+            <a:r>
+              <a:rPr lang="ko-KR" altLang="en-US" dirty="0"/>
+              <a:t>수행</a:t>
+            </a:r>
+            <a:endParaRPr lang="en-US" altLang="ko-KR" dirty="0"/>
+          </a:p>
+          <a:p>
+            <a:pPr lvl="2"/>
+            <a:r>
+              <a:rPr lang="en-US" altLang="ko-KR" dirty="0"/>
+              <a:t>pull.jpg</a:t>
+            </a:r>
+          </a:p>
+          <a:p>
+            <a:pPr lvl="2"/>
+            <a:endParaRPr lang="en-US" altLang="ko-KR" dirty="0"/>
+          </a:p>
+          <a:p>
+            <a:r>
+              <a:rPr lang="ko-KR" altLang="en-US" dirty="0"/>
+              <a:t>제출 기한</a:t>
+            </a:r>
+            <a:r>
+              <a:rPr lang="en-US" altLang="ko-KR" dirty="0"/>
+              <a:t>:</a:t>
+            </a:r>
+          </a:p>
+          <a:p>
+            <a:pPr lvl="1"/>
+            <a:r>
+              <a:rPr lang="en-US" altLang="ko-KR" dirty="0"/>
+              <a:t>10/20 (</a:t>
+            </a:r>
+            <a:r>
+              <a:rPr lang="ko-KR" altLang="en-US" dirty="0"/>
+              <a:t>일</a:t>
+            </a:r>
+            <a:r>
+              <a:rPr lang="en-US" altLang="ko-KR" dirty="0"/>
+              <a:t>) 23:59</a:t>
+            </a:r>
+          </a:p>
+          <a:p>
+            <a:pPr lvl="1"/>
+            <a:r>
+              <a:rPr lang="ko-KR" altLang="en-US" dirty="0"/>
+              <a:t>지각 감점</a:t>
+            </a:r>
+            <a:r>
+              <a:rPr lang="en-US" altLang="ko-KR" dirty="0"/>
+              <a:t>: 5%p / day</a:t>
+            </a:r>
+            <a:r>
+              <a:rPr lang="ko-KR" altLang="en-US" dirty="0"/>
+              <a:t> </a:t>
+            </a:r>
+            <a:r>
+              <a:rPr lang="en-US" altLang="ko-KR" dirty="0"/>
+              <a:t>(3</a:t>
+            </a:r>
+            <a:r>
+              <a:rPr lang="ko-KR" altLang="en-US" dirty="0"/>
+              <a:t>주 내 제출해야 함</a:t>
+            </a:r>
+            <a:r>
+              <a:rPr lang="en-US" altLang="ko-KR" dirty="0"/>
+              <a:t>)</a:t>
+            </a:r>
+          </a:p>
+          <a:p>
+            <a:pPr lvl="1"/>
+            <a:endParaRPr lang="en-US" altLang="ko-KR" dirty="0"/>
+          </a:p>
+          <a:p>
+            <a:pPr lvl="2"/>
+            <a:endParaRPr lang="en-US" altLang="ko-KR" dirty="0"/>
+          </a:p>
+          <a:p>
+            <a:pPr lvl="1"/>
+            <a:endParaRPr lang="ko-KR" altLang="en-US" dirty="0"/>
+          </a:p>
+        </p:txBody>
+      </p:sp>
       <p:sp>
         <p:nvSpPr>
           <p:cNvPr id="4" name="슬라이드 번호 개체 틀 3"/>
@@ -13628,7 +13917,7 @@
     </p:spTree>
     <p:extLst>
       <p:ext uri="{BB962C8B-B14F-4D97-AF65-F5344CB8AC3E}">
-        <p14:creationId xmlns:p14="http://schemas.microsoft.com/office/powerpoint/2010/main" val="2819048120"/>
+        <p14:creationId xmlns:p14="http://schemas.microsoft.com/office/powerpoint/2010/main" val="1422922605"/>
       </p:ext>
     </p:extLst>
   </p:cSld>

</xml_diff>